<commit_message>
ch pptx and sleeping
</commit_message>
<xml_diff>
--- a/Presentation/Presentation Group 1_OS_Unifr.pptx
+++ b/Presentation/Presentation Group 1_OS_Unifr.pptx
@@ -27,9 +27,9 @@
     <p:sldId id="275" r:id="rId18"/>
     <p:sldId id="276" r:id="rId19"/>
     <p:sldId id="277" r:id="rId20"/>
-    <p:sldId id="278" r:id="rId21"/>
-    <p:sldId id="279" r:id="rId22"/>
-    <p:sldId id="280" r:id="rId23"/>
+    <p:sldId id="280" r:id="rId21"/>
+    <p:sldId id="285" r:id="rId22"/>
+    <p:sldId id="278" r:id="rId23"/>
     <p:sldId id="282" r:id="rId24"/>
     <p:sldId id="283" r:id="rId25"/>
     <p:sldId id="284" r:id="rId26"/>
@@ -982,7 +982,7 @@
           <a:p>
             <a:fld id="{798E3D03-6BB1-4E8B-AEFD-D58DDCAFA619}" type="datetimeFigureOut">
               <a:rPr lang="en-GB" smtClean="0"/>
-              <a:t>25/05/2022</a:t>
+              <a:t>27/05/2022</a:t>
             </a:fld>
             <a:endParaRPr lang="en-GB"/>
           </a:p>
@@ -1399,7 +1399,7 @@
           <a:p>
             <a:fld id="{E5FD23AC-3380-4E1C-B46F-D96C5D53F69C}" type="datetime1">
               <a:rPr lang="en-US" smtClean="0"/>
-              <a:t>5/25/2022</a:t>
+              <a:t>5/27/2022</a:t>
             </a:fld>
             <a:endParaRPr lang="en-US"/>
           </a:p>
@@ -1599,7 +1599,7 @@
           <a:p>
             <a:fld id="{357586AA-8F40-4881-938C-6E6BD2AE7728}" type="datetime1">
               <a:rPr lang="en-US" smtClean="0"/>
-              <a:t>5/25/2022</a:t>
+              <a:t>5/27/2022</a:t>
             </a:fld>
             <a:endParaRPr lang="en-US"/>
           </a:p>
@@ -1809,7 +1809,7 @@
           <a:p>
             <a:fld id="{D536A684-BDCE-46EA-B805-627EC3E6768C}" type="datetime1">
               <a:rPr lang="en-US" smtClean="0"/>
-              <a:t>5/25/2022</a:t>
+              <a:t>5/27/2022</a:t>
             </a:fld>
             <a:endParaRPr lang="en-US"/>
           </a:p>
@@ -2009,7 +2009,7 @@
           <a:p>
             <a:fld id="{B4E8D3CB-082F-48B6-BC28-54F208CA9A04}" type="datetime1">
               <a:rPr lang="en-US" smtClean="0"/>
-              <a:t>5/25/2022</a:t>
+              <a:t>5/27/2022</a:t>
             </a:fld>
             <a:endParaRPr lang="en-US"/>
           </a:p>
@@ -2285,7 +2285,7 @@
           <a:p>
             <a:fld id="{81907AE0-B4B2-4F02-8FE1-C48F50A7A312}" type="datetime1">
               <a:rPr lang="en-US" smtClean="0"/>
-              <a:t>5/25/2022</a:t>
+              <a:t>5/27/2022</a:t>
             </a:fld>
             <a:endParaRPr lang="en-US"/>
           </a:p>
@@ -2553,7 +2553,7 @@
           <a:p>
             <a:fld id="{CC6A78C3-B542-482E-8867-5033290DCE88}" type="datetime1">
               <a:rPr lang="en-US" smtClean="0"/>
-              <a:t>5/25/2022</a:t>
+              <a:t>5/27/2022</a:t>
             </a:fld>
             <a:endParaRPr lang="en-US"/>
           </a:p>
@@ -2968,7 +2968,7 @@
           <a:p>
             <a:fld id="{C7ECA7FE-1BF4-4F82-A444-680FDAE69B4A}" type="datetime1">
               <a:rPr lang="en-US" smtClean="0"/>
-              <a:t>5/25/2022</a:t>
+              <a:t>5/27/2022</a:t>
             </a:fld>
             <a:endParaRPr lang="en-US"/>
           </a:p>
@@ -3110,7 +3110,7 @@
           <a:p>
             <a:fld id="{4813E7FD-110F-43E0-903E-3132E750135F}" type="datetime1">
               <a:rPr lang="en-US" smtClean="0"/>
-              <a:t>5/25/2022</a:t>
+              <a:t>5/27/2022</a:t>
             </a:fld>
             <a:endParaRPr lang="en-US"/>
           </a:p>
@@ -3223,7 +3223,7 @@
           <a:p>
             <a:fld id="{BDBC415F-6ACC-4E00-85A7-5FFDE68EB84C}" type="datetime1">
               <a:rPr lang="en-US" smtClean="0"/>
-              <a:t>5/25/2022</a:t>
+              <a:t>5/27/2022</a:t>
             </a:fld>
             <a:endParaRPr lang="en-US"/>
           </a:p>
@@ -3536,7 +3536,7 @@
           <a:p>
             <a:fld id="{ACB196A5-AE60-4E03-B64A-211A67598798}" type="datetime1">
               <a:rPr lang="en-US" smtClean="0"/>
-              <a:t>5/25/2022</a:t>
+              <a:t>5/27/2022</a:t>
             </a:fld>
             <a:endParaRPr lang="en-US"/>
           </a:p>
@@ -3825,7 +3825,7 @@
           <a:p>
             <a:fld id="{E1736CA9-5EBE-4D02-8A4F-04FA61D34D3A}" type="datetime1">
               <a:rPr lang="en-US" smtClean="0"/>
-              <a:t>5/25/2022</a:t>
+              <a:t>5/27/2022</a:t>
             </a:fld>
             <a:endParaRPr lang="en-US"/>
           </a:p>
@@ -4068,7 +4068,7 @@
           <a:p>
             <a:fld id="{95E2E09A-0856-49F1-8A49-CD7C39870C37}" type="datetime1">
               <a:rPr lang="en-US" smtClean="0"/>
-              <a:t>5/25/2022</a:t>
+              <a:t>5/27/2022</a:t>
             </a:fld>
             <a:endParaRPr lang="en-US"/>
           </a:p>
@@ -6602,7 +6602,7 @@
           <a:p>
             <a:r>
               <a:rPr lang="en-GB" dirty="0"/>
-              <a:t>Add one</a:t>
+              <a:t>Timing</a:t>
             </a:r>
           </a:p>
           <a:p>
@@ -6716,6 +6716,36 @@
           </a:p>
         </p:txBody>
       </p:sp>
+      <p:pic>
+        <p:nvPicPr>
+          <p:cNvPr id="8" name="Grafik 7">
+            <a:extLst>
+              <a:ext uri="{FF2B5EF4-FFF2-40B4-BE49-F238E27FC236}">
+                <a16:creationId xmlns:a16="http://schemas.microsoft.com/office/drawing/2014/main" id="{9EE5ACB7-89E3-33E2-DFBB-96C20DFBB3C2}"/>
+              </a:ext>
+            </a:extLst>
+          </p:cNvPr>
+          <p:cNvPicPr>
+            <a:picLocks noChangeAspect="1"/>
+          </p:cNvPicPr>
+          <p:nvPr/>
+        </p:nvPicPr>
+        <p:blipFill>
+          <a:blip r:embed="rId2"/>
+          <a:stretch>
+            <a:fillRect/>
+          </a:stretch>
+        </p:blipFill>
+        <p:spPr>
+          <a:xfrm>
+            <a:off x="838200" y="2447303"/>
+            <a:ext cx="6373114" cy="4010585"/>
+          </a:xfrm>
+          <a:prstGeom prst="rect">
+            <a:avLst/>
+          </a:prstGeom>
+        </p:spPr>
+      </p:pic>
     </p:spTree>
     <p:extLst>
       <p:ext uri="{BB962C8B-B14F-4D97-AF65-F5344CB8AC3E}">
@@ -7179,10 +7209,40 @@
           </a:p>
         </p:txBody>
       </p:sp>
+      <p:pic>
+        <p:nvPicPr>
+          <p:cNvPr id="7" name="Grafik 6">
+            <a:extLst>
+              <a:ext uri="{FF2B5EF4-FFF2-40B4-BE49-F238E27FC236}">
+                <a16:creationId xmlns:a16="http://schemas.microsoft.com/office/drawing/2014/main" id="{2D1797AA-C26B-0E78-31FE-2C8808078258}"/>
+              </a:ext>
+            </a:extLst>
+          </p:cNvPr>
+          <p:cNvPicPr>
+            <a:picLocks noChangeAspect="1"/>
+          </p:cNvPicPr>
+          <p:nvPr/>
+        </p:nvPicPr>
+        <p:blipFill>
+          <a:blip r:embed="rId2"/>
+          <a:stretch>
+            <a:fillRect/>
+          </a:stretch>
+        </p:blipFill>
+        <p:spPr>
+          <a:xfrm>
+            <a:off x="2433126" y="1176023"/>
+            <a:ext cx="7325747" cy="4505954"/>
+          </a:xfrm>
+          <a:prstGeom prst="rect">
+            <a:avLst/>
+          </a:prstGeom>
+        </p:spPr>
+      </p:pic>
     </p:spTree>
     <p:extLst>
       <p:ext uri="{BB962C8B-B14F-4D97-AF65-F5344CB8AC3E}">
-        <p14:creationId xmlns:p14="http://schemas.microsoft.com/office/powerpoint/2010/main" val="662193684"/>
+        <p14:creationId xmlns:p14="http://schemas.microsoft.com/office/powerpoint/2010/main" val="1929192034"/>
       </p:ext>
     </p:extLst>
   </p:cSld>
@@ -7286,7 +7346,11 @@
           <a:p>
             <a:r>
               <a:rPr lang="en-GB" dirty="0"/>
-              <a:t>Template</a:t>
+              <a:t>4) Additional Feature – </a:t>
+            </a:r>
+            <a:r>
+              <a:rPr lang="en-GB" i="1" dirty="0"/>
+              <a:t>Sleeping Baker</a:t>
             </a:r>
           </a:p>
         </p:txBody>
@@ -7374,10 +7438,124 @@
           </a:p>
         </p:txBody>
       </p:sp>
+      <p:sp>
+        <p:nvSpPr>
+          <p:cNvPr id="6" name="Rechteck 5">
+            <a:extLst>
+              <a:ext uri="{FF2B5EF4-FFF2-40B4-BE49-F238E27FC236}">
+                <a16:creationId xmlns:a16="http://schemas.microsoft.com/office/drawing/2014/main" id="{704AB728-31D4-BBCE-EB2D-AF4E22A47A60}"/>
+              </a:ext>
+            </a:extLst>
+          </p:cNvPr>
+          <p:cNvSpPr/>
+          <p:nvPr/>
+        </p:nvSpPr>
+        <p:spPr>
+          <a:xfrm rot="2700000">
+            <a:off x="182544" y="-563278"/>
+            <a:ext cx="227330" cy="1721870"/>
+          </a:xfrm>
+          <a:prstGeom prst="rect">
+            <a:avLst/>
+          </a:prstGeom>
+          <a:solidFill>
+            <a:srgbClr val="7030A0"/>
+          </a:solidFill>
+          <a:ln>
+            <a:solidFill>
+              <a:schemeClr val="tx1"/>
+            </a:solidFill>
+          </a:ln>
+        </p:spPr>
+        <p:style>
+          <a:lnRef idx="2">
+            <a:schemeClr val="accent1">
+              <a:shade val="50000"/>
+            </a:schemeClr>
+          </a:lnRef>
+          <a:fillRef idx="1">
+            <a:schemeClr val="accent1"/>
+          </a:fillRef>
+          <a:effectRef idx="0">
+            <a:schemeClr val="accent1"/>
+          </a:effectRef>
+          <a:fontRef idx="minor">
+            <a:schemeClr val="lt1"/>
+          </a:fontRef>
+        </p:style>
+        <p:txBody>
+          <a:bodyPr rtlCol="0" anchor="ctr"/>
+          <a:lstStyle/>
+          <a:p>
+            <a:pPr algn="ctr"/>
+            <a:endParaRPr lang="en-GB"/>
+          </a:p>
+        </p:txBody>
+      </p:sp>
+      <p:pic>
+        <p:nvPicPr>
+          <p:cNvPr id="8" name="Grafik 7">
+            <a:extLst>
+              <a:ext uri="{FF2B5EF4-FFF2-40B4-BE49-F238E27FC236}">
+                <a16:creationId xmlns:a16="http://schemas.microsoft.com/office/drawing/2014/main" id="{9EE5ACB7-89E3-33E2-DFBB-96C20DFBB3C2}"/>
+              </a:ext>
+            </a:extLst>
+          </p:cNvPr>
+          <p:cNvPicPr>
+            <a:picLocks noChangeAspect="1"/>
+          </p:cNvPicPr>
+          <p:nvPr/>
+        </p:nvPicPr>
+        <p:blipFill>
+          <a:blip r:embed="rId2"/>
+          <a:stretch>
+            <a:fillRect/>
+          </a:stretch>
+        </p:blipFill>
+        <p:spPr>
+          <a:xfrm>
+            <a:off x="838200" y="2447303"/>
+            <a:ext cx="6373114" cy="4010585"/>
+          </a:xfrm>
+          <a:prstGeom prst="rect">
+            <a:avLst/>
+          </a:prstGeom>
+        </p:spPr>
+      </p:pic>
+      <p:pic>
+        <p:nvPicPr>
+          <p:cNvPr id="9" name="Grafik 8">
+            <a:extLst>
+              <a:ext uri="{FF2B5EF4-FFF2-40B4-BE49-F238E27FC236}">
+                <a16:creationId xmlns:a16="http://schemas.microsoft.com/office/drawing/2014/main" id="{66567A6E-709D-E7E2-D6BC-6EB31E982ACE}"/>
+              </a:ext>
+            </a:extLst>
+          </p:cNvPr>
+          <p:cNvPicPr>
+            <a:picLocks noChangeAspect="1"/>
+          </p:cNvPicPr>
+          <p:nvPr/>
+        </p:nvPicPr>
+        <p:blipFill>
+          <a:blip r:embed="rId3"/>
+          <a:stretch>
+            <a:fillRect/>
+          </a:stretch>
+        </p:blipFill>
+        <p:spPr>
+          <a:xfrm>
+            <a:off x="7328384" y="2447303"/>
+            <a:ext cx="4725059" cy="2924583"/>
+          </a:xfrm>
+          <a:prstGeom prst="rect">
+            <a:avLst/>
+          </a:prstGeom>
+        </p:spPr>
+      </p:pic>
     </p:spTree>
     <p:extLst>
       <p:ext uri="{BB962C8B-B14F-4D97-AF65-F5344CB8AC3E}">
-        <p14:creationId xmlns:p14="http://schemas.microsoft.com/office/powerpoint/2010/main" val="1908477047"/>
+        <p14:creationId xmlns:p14="http://schemas.microsoft.com/office/powerpoint/2010/main" val="2237582396"/>
       </p:ext>
     </p:extLst>
   </p:cSld>
@@ -7404,6 +7582,36 @@
           <a:chExt cx="0" cy="0"/>
         </a:xfrm>
       </p:grpSpPr>
+      <p:pic>
+        <p:nvPicPr>
+          <p:cNvPr id="9" name="Grafik 8">
+            <a:extLst>
+              <a:ext uri="{FF2B5EF4-FFF2-40B4-BE49-F238E27FC236}">
+                <a16:creationId xmlns:a16="http://schemas.microsoft.com/office/drawing/2014/main" id="{2C94DB34-FC6A-6FCF-A6A2-F3CB27061A45}"/>
+              </a:ext>
+            </a:extLst>
+          </p:cNvPr>
+          <p:cNvPicPr>
+            <a:picLocks noChangeAspect="1"/>
+          </p:cNvPicPr>
+          <p:nvPr/>
+        </p:nvPicPr>
+        <p:blipFill>
+          <a:blip r:embed="rId2"/>
+          <a:stretch>
+            <a:fillRect/>
+          </a:stretch>
+        </p:blipFill>
+        <p:spPr>
+          <a:xfrm>
+            <a:off x="7468614" y="3796892"/>
+            <a:ext cx="4610743" cy="2924583"/>
+          </a:xfrm>
+          <a:prstGeom prst="rect">
+            <a:avLst/>
+          </a:prstGeom>
+        </p:spPr>
+      </p:pic>
       <p:sp>
         <p:nvSpPr>
           <p:cNvPr id="5" name="Rechteck 4">
@@ -7509,17 +7717,11 @@
           <a:p>
             <a:r>
               <a:rPr lang="en-GB" dirty="0"/>
-              <a:t>Add one</a:t>
+              <a:t>Stopping Condition:</a:t>
             </a:r>
           </a:p>
           <a:p>
             <a:endParaRPr lang="en-GB" dirty="0"/>
-          </a:p>
-          <a:p>
-            <a:r>
-              <a:rPr lang="en-GB" dirty="0"/>
-              <a:t>Add two</a:t>
-            </a:r>
           </a:p>
           <a:p>
             <a:endParaRPr lang="en-GB" dirty="0"/>
@@ -7569,10 +7771,40 @@
           </a:p>
         </p:txBody>
       </p:sp>
+      <p:pic>
+        <p:nvPicPr>
+          <p:cNvPr id="7" name="Grafik 6">
+            <a:extLst>
+              <a:ext uri="{FF2B5EF4-FFF2-40B4-BE49-F238E27FC236}">
+                <a16:creationId xmlns:a16="http://schemas.microsoft.com/office/drawing/2014/main" id="{D0DA355C-91B3-EDF8-9D34-4738FBEA9FE8}"/>
+              </a:ext>
+            </a:extLst>
+          </p:cNvPr>
+          <p:cNvPicPr>
+            <a:picLocks noChangeAspect="1"/>
+          </p:cNvPicPr>
+          <p:nvPr/>
+        </p:nvPicPr>
+        <p:blipFill>
+          <a:blip r:embed="rId3"/>
+          <a:stretch>
+            <a:fillRect/>
+          </a:stretch>
+        </p:blipFill>
+        <p:spPr>
+          <a:xfrm>
+            <a:off x="7468614" y="1512186"/>
+            <a:ext cx="3029373" cy="2105319"/>
+          </a:xfrm>
+          <a:prstGeom prst="rect">
+            <a:avLst/>
+          </a:prstGeom>
+        </p:spPr>
+      </p:pic>
     </p:spTree>
     <p:extLst>
       <p:ext uri="{BB962C8B-B14F-4D97-AF65-F5344CB8AC3E}">
-        <p14:creationId xmlns:p14="http://schemas.microsoft.com/office/powerpoint/2010/main" val="1929192034"/>
+        <p14:creationId xmlns:p14="http://schemas.microsoft.com/office/powerpoint/2010/main" val="662193684"/>
       </p:ext>
     </p:extLst>
   </p:cSld>

</xml_diff>

<commit_message>
Added slides for too-good-to-go
</commit_message>
<xml_diff>
--- a/Presentation/Presentation Group 1_OS_Unifr.pptx
+++ b/Presentation/Presentation Group 1_OS_Unifr.pptx
@@ -5,7 +5,7 @@
     <p:sldMasterId id="2147483678" r:id="rId1"/>
   </p:sldMasterIdLst>
   <p:notesMasterIdLst>
-    <p:notesMasterId r:id="rId29"/>
+    <p:notesMasterId r:id="rId28"/>
   </p:notesMasterIdLst>
   <p:sldIdLst>
     <p:sldId id="256" r:id="rId2"/>
@@ -25,16 +25,15 @@
     <p:sldId id="272" r:id="rId16"/>
     <p:sldId id="274" r:id="rId17"/>
     <p:sldId id="275" r:id="rId18"/>
-    <p:sldId id="276" r:id="rId19"/>
-    <p:sldId id="277" r:id="rId20"/>
-    <p:sldId id="280" r:id="rId21"/>
-    <p:sldId id="285" r:id="rId22"/>
-    <p:sldId id="278" r:id="rId23"/>
-    <p:sldId id="282" r:id="rId24"/>
-    <p:sldId id="283" r:id="rId25"/>
-    <p:sldId id="284" r:id="rId26"/>
-    <p:sldId id="281" r:id="rId27"/>
-    <p:sldId id="271" r:id="rId28"/>
+    <p:sldId id="277" r:id="rId19"/>
+    <p:sldId id="280" r:id="rId20"/>
+    <p:sldId id="285" r:id="rId21"/>
+    <p:sldId id="278" r:id="rId22"/>
+    <p:sldId id="282" r:id="rId23"/>
+    <p:sldId id="283" r:id="rId24"/>
+    <p:sldId id="284" r:id="rId25"/>
+    <p:sldId id="281" r:id="rId26"/>
+    <p:sldId id="271" r:id="rId27"/>
   </p:sldIdLst>
   <p:sldSz cx="12192000" cy="6858000"/>
   <p:notesSz cx="6858000" cy="9144000"/>
@@ -149,757 +148,6 @@
 </p1510:revInfo>
 </file>
 
-<file path=ppt/changesInfos/changesInfo1.xml><?xml version="1.0" encoding="utf-8"?>
-<pc:chgInfo xmlns:a="http://schemas.openxmlformats.org/drawingml/2006/main" xmlns:r="http://schemas.openxmlformats.org/officeDocument/2006/relationships" xmlns:ac="http://schemas.microsoft.com/office/drawing/2013/main/command" xmlns:pc="http://schemas.microsoft.com/office/powerpoint/2013/main/command">
-  <pc:docChgLst>
-    <pc:chgData name="ODERMATT Lukas" userId="0e152a97-f44b-45ff-a03a-73f06bfbf172" providerId="ADAL" clId="{E9D7B506-AC64-490E-A5CD-7DE3A2BDBBEC}"/>
-    <pc:docChg chg="undo custSel addSld delSld modSld sldOrd">
-      <pc:chgData name="ODERMATT Lukas" userId="0e152a97-f44b-45ff-a03a-73f06bfbf172" providerId="ADAL" clId="{E9D7B506-AC64-490E-A5CD-7DE3A2BDBBEC}" dt="2022-05-25T12:10:01.755" v="2368" actId="114"/>
-      <pc:docMkLst>
-        <pc:docMk/>
-      </pc:docMkLst>
-      <pc:sldChg chg="addSp delSp modSp mod">
-        <pc:chgData name="ODERMATT Lukas" userId="0e152a97-f44b-45ff-a03a-73f06bfbf172" providerId="ADAL" clId="{E9D7B506-AC64-490E-A5CD-7DE3A2BDBBEC}" dt="2022-05-25T00:46:57.348" v="405" actId="478"/>
-        <pc:sldMkLst>
-          <pc:docMk/>
-          <pc:sldMk cId="183146205" sldId="256"/>
-        </pc:sldMkLst>
-        <pc:spChg chg="add mod">
-          <ac:chgData name="ODERMATT Lukas" userId="0e152a97-f44b-45ff-a03a-73f06bfbf172" providerId="ADAL" clId="{E9D7B506-AC64-490E-A5CD-7DE3A2BDBBEC}" dt="2022-05-25T00:45:01.962" v="389"/>
-          <ac:spMkLst>
-            <pc:docMk/>
-            <pc:sldMk cId="183146205" sldId="256"/>
-            <ac:spMk id="4" creationId="{15E52520-C62B-0013-2922-38E1813BAEE8}"/>
-          </ac:spMkLst>
-        </pc:spChg>
-        <pc:spChg chg="add del mod">
-          <ac:chgData name="ODERMATT Lukas" userId="0e152a97-f44b-45ff-a03a-73f06bfbf172" providerId="ADAL" clId="{E9D7B506-AC64-490E-A5CD-7DE3A2BDBBEC}" dt="2022-05-25T00:46:57.348" v="405" actId="478"/>
-          <ac:spMkLst>
-            <pc:docMk/>
-            <pc:sldMk cId="183146205" sldId="256"/>
-            <ac:spMk id="5" creationId="{8D40D6F5-5C8D-2227-DF4D-F1C195DD5FC8}"/>
-          </ac:spMkLst>
-        </pc:spChg>
-        <pc:spChg chg="add mod">
-          <ac:chgData name="ODERMATT Lukas" userId="0e152a97-f44b-45ff-a03a-73f06bfbf172" providerId="ADAL" clId="{E9D7B506-AC64-490E-A5CD-7DE3A2BDBBEC}" dt="2022-05-25T00:46:55.698" v="404"/>
-          <ac:spMkLst>
-            <pc:docMk/>
-            <pc:sldMk cId="183146205" sldId="256"/>
-            <ac:spMk id="6" creationId="{11542E1F-DE74-09B2-85B8-C5E9DEB864FA}"/>
-          </ac:spMkLst>
-        </pc:spChg>
-      </pc:sldChg>
-      <pc:sldChg chg="addSp modSp mod">
-        <pc:chgData name="ODERMATT Lukas" userId="0e152a97-f44b-45ff-a03a-73f06bfbf172" providerId="ADAL" clId="{E9D7B506-AC64-490E-A5CD-7DE3A2BDBBEC}" dt="2022-05-25T12:10:01.755" v="2368" actId="114"/>
-        <pc:sldMkLst>
-          <pc:docMk/>
-          <pc:sldMk cId="2493417131" sldId="257"/>
-        </pc:sldMkLst>
-        <pc:spChg chg="mod">
-          <ac:chgData name="ODERMATT Lukas" userId="0e152a97-f44b-45ff-a03a-73f06bfbf172" providerId="ADAL" clId="{E9D7B506-AC64-490E-A5CD-7DE3A2BDBBEC}" dt="2022-05-25T01:20:32.380" v="1359" actId="115"/>
-          <ac:spMkLst>
-            <pc:docMk/>
-            <pc:sldMk cId="2493417131" sldId="257"/>
-            <ac:spMk id="2" creationId="{5C91C23D-B1B2-F2A7-7581-BDF4D5D20568}"/>
-          </ac:spMkLst>
-        </pc:spChg>
-        <pc:spChg chg="mod">
-          <ac:chgData name="ODERMATT Lukas" userId="0e152a97-f44b-45ff-a03a-73f06bfbf172" providerId="ADAL" clId="{E9D7B506-AC64-490E-A5CD-7DE3A2BDBBEC}" dt="2022-05-25T12:10:01.755" v="2368" actId="114"/>
-          <ac:spMkLst>
-            <pc:docMk/>
-            <pc:sldMk cId="2493417131" sldId="257"/>
-            <ac:spMk id="3" creationId="{58AC9D7B-EF32-B0DE-D2FE-AD568D61A174}"/>
-          </ac:spMkLst>
-        </pc:spChg>
-        <pc:spChg chg="mod">
-          <ac:chgData name="ODERMATT Lukas" userId="0e152a97-f44b-45ff-a03a-73f06bfbf172" providerId="ADAL" clId="{E9D7B506-AC64-490E-A5CD-7DE3A2BDBBEC}" dt="2022-05-25T00:46:17.354" v="403" actId="207"/>
-          <ac:spMkLst>
-            <pc:docMk/>
-            <pc:sldMk cId="2493417131" sldId="257"/>
-            <ac:spMk id="4" creationId="{E497BC7E-28CC-51EF-D687-416EBA653E84}"/>
-          </ac:spMkLst>
-        </pc:spChg>
-        <pc:spChg chg="add mod">
-          <ac:chgData name="ODERMATT Lukas" userId="0e152a97-f44b-45ff-a03a-73f06bfbf172" providerId="ADAL" clId="{E9D7B506-AC64-490E-A5CD-7DE3A2BDBBEC}" dt="2022-05-25T00:44:57.418" v="388"/>
-          <ac:spMkLst>
-            <pc:docMk/>
-            <pc:sldMk cId="2493417131" sldId="257"/>
-            <ac:spMk id="5" creationId="{56DA0789-BEA4-04B9-6485-BECA14ABDA40}"/>
-          </ac:spMkLst>
-        </pc:spChg>
-        <pc:spChg chg="add mod ord">
-          <ac:chgData name="ODERMATT Lukas" userId="0e152a97-f44b-45ff-a03a-73f06bfbf172" providerId="ADAL" clId="{E9D7B506-AC64-490E-A5CD-7DE3A2BDBBEC}" dt="2022-05-25T00:45:48.048" v="402" actId="1076"/>
-          <ac:spMkLst>
-            <pc:docMk/>
-            <pc:sldMk cId="2493417131" sldId="257"/>
-            <ac:spMk id="6" creationId="{4E610316-300D-5544-E20C-51A5485493AE}"/>
-          </ac:spMkLst>
-        </pc:spChg>
-      </pc:sldChg>
-      <pc:sldChg chg="modSp mod ord">
-        <pc:chgData name="ODERMATT Lukas" userId="0e152a97-f44b-45ff-a03a-73f06bfbf172" providerId="ADAL" clId="{E9D7B506-AC64-490E-A5CD-7DE3A2BDBBEC}" dt="2022-05-25T01:17:41.873" v="1211"/>
-        <pc:sldMkLst>
-          <pc:docMk/>
-          <pc:sldMk cId="2901204117" sldId="258"/>
-        </pc:sldMkLst>
-        <pc:spChg chg="mod">
-          <ac:chgData name="ODERMATT Lukas" userId="0e152a97-f44b-45ff-a03a-73f06bfbf172" providerId="ADAL" clId="{E9D7B506-AC64-490E-A5CD-7DE3A2BDBBEC}" dt="2022-05-25T00:23:14.695" v="89" actId="114"/>
-          <ac:spMkLst>
-            <pc:docMk/>
-            <pc:sldMk cId="2901204117" sldId="258"/>
-            <ac:spMk id="2" creationId="{054DDC10-DD77-84A3-B683-6C5065D184BF}"/>
-          </ac:spMkLst>
-        </pc:spChg>
-      </pc:sldChg>
-      <pc:sldChg chg="modSp mod ord">
-        <pc:chgData name="ODERMATT Lukas" userId="0e152a97-f44b-45ff-a03a-73f06bfbf172" providerId="ADAL" clId="{E9D7B506-AC64-490E-A5CD-7DE3A2BDBBEC}" dt="2022-05-25T01:17:45.511" v="1213"/>
-        <pc:sldMkLst>
-          <pc:docMk/>
-          <pc:sldMk cId="1433076985" sldId="259"/>
-        </pc:sldMkLst>
-        <pc:spChg chg="mod">
-          <ac:chgData name="ODERMATT Lukas" userId="0e152a97-f44b-45ff-a03a-73f06bfbf172" providerId="ADAL" clId="{E9D7B506-AC64-490E-A5CD-7DE3A2BDBBEC}" dt="2022-05-25T00:21:30.057" v="6" actId="20577"/>
-          <ac:spMkLst>
-            <pc:docMk/>
-            <pc:sldMk cId="1433076985" sldId="259"/>
-            <ac:spMk id="2" creationId="{CB51845A-2E7A-EF06-5586-FCB3A8945CED}"/>
-          </ac:spMkLst>
-        </pc:spChg>
-      </pc:sldChg>
-      <pc:sldChg chg="modSp mod ord">
-        <pc:chgData name="ODERMATT Lukas" userId="0e152a97-f44b-45ff-a03a-73f06bfbf172" providerId="ADAL" clId="{E9D7B506-AC64-490E-A5CD-7DE3A2BDBBEC}" dt="2022-05-25T01:25:34.427" v="1713" actId="20577"/>
-        <pc:sldMkLst>
-          <pc:docMk/>
-          <pc:sldMk cId="3234761899" sldId="260"/>
-        </pc:sldMkLst>
-        <pc:spChg chg="mod">
-          <ac:chgData name="ODERMATT Lukas" userId="0e152a97-f44b-45ff-a03a-73f06bfbf172" providerId="ADAL" clId="{E9D7B506-AC64-490E-A5CD-7DE3A2BDBBEC}" dt="2022-05-25T01:25:34.427" v="1713" actId="20577"/>
-          <ac:spMkLst>
-            <pc:docMk/>
-            <pc:sldMk cId="3234761899" sldId="260"/>
-            <ac:spMk id="2" creationId="{17400163-CE83-D841-A8A7-8385F27179B9}"/>
-          </ac:spMkLst>
-        </pc:spChg>
-      </pc:sldChg>
-      <pc:sldChg chg="ord">
-        <pc:chgData name="ODERMATT Lukas" userId="0e152a97-f44b-45ff-a03a-73f06bfbf172" providerId="ADAL" clId="{E9D7B506-AC64-490E-A5CD-7DE3A2BDBBEC}" dt="2022-05-25T01:18:47.718" v="1286"/>
-        <pc:sldMkLst>
-          <pc:docMk/>
-          <pc:sldMk cId="110043969" sldId="261"/>
-        </pc:sldMkLst>
-      </pc:sldChg>
-      <pc:sldChg chg="addSp delSp modSp new mod">
-        <pc:chgData name="ODERMATT Lukas" userId="0e152a97-f44b-45ff-a03a-73f06bfbf172" providerId="ADAL" clId="{E9D7B506-AC64-490E-A5CD-7DE3A2BDBBEC}" dt="2022-05-25T01:39:13.457" v="2224" actId="20577"/>
-        <pc:sldMkLst>
-          <pc:docMk/>
-          <pc:sldMk cId="161030841" sldId="262"/>
-        </pc:sldMkLst>
-        <pc:spChg chg="mod">
-          <ac:chgData name="ODERMATT Lukas" userId="0e152a97-f44b-45ff-a03a-73f06bfbf172" providerId="ADAL" clId="{E9D7B506-AC64-490E-A5CD-7DE3A2BDBBEC}" dt="2022-05-25T01:20:22.451" v="1356" actId="115"/>
-          <ac:spMkLst>
-            <pc:docMk/>
-            <pc:sldMk cId="161030841" sldId="262"/>
-            <ac:spMk id="2" creationId="{D29F7A83-12B4-9D74-5649-05240742CE19}"/>
-          </ac:spMkLst>
-        </pc:spChg>
-        <pc:spChg chg="mod">
-          <ac:chgData name="ODERMATT Lukas" userId="0e152a97-f44b-45ff-a03a-73f06bfbf172" providerId="ADAL" clId="{E9D7B506-AC64-490E-A5CD-7DE3A2BDBBEC}" dt="2022-05-25T01:39:13.457" v="2224" actId="20577"/>
-          <ac:spMkLst>
-            <pc:docMk/>
-            <pc:sldMk cId="161030841" sldId="262"/>
-            <ac:spMk id="3" creationId="{56929CB6-1559-0DD1-B9C9-F49DB5A8FD77}"/>
-          </ac:spMkLst>
-        </pc:spChg>
-        <pc:spChg chg="mod">
-          <ac:chgData name="ODERMATT Lukas" userId="0e152a97-f44b-45ff-a03a-73f06bfbf172" providerId="ADAL" clId="{E9D7B506-AC64-490E-A5CD-7DE3A2BDBBEC}" dt="2022-05-25T00:49:11.244" v="418" actId="207"/>
-          <ac:spMkLst>
-            <pc:docMk/>
-            <pc:sldMk cId="161030841" sldId="262"/>
-            <ac:spMk id="4" creationId="{5F812391-1D95-81DC-CFDD-A85634B7CF65}"/>
-          </ac:spMkLst>
-        </pc:spChg>
-        <pc:spChg chg="add mod ord">
-          <ac:chgData name="ODERMATT Lukas" userId="0e152a97-f44b-45ff-a03a-73f06bfbf172" providerId="ADAL" clId="{E9D7B506-AC64-490E-A5CD-7DE3A2BDBBEC}" dt="2022-05-25T00:49:01.816" v="417" actId="167"/>
-          <ac:spMkLst>
-            <pc:docMk/>
-            <pc:sldMk cId="161030841" sldId="262"/>
-            <ac:spMk id="5" creationId="{FE9C6FD6-FE65-42AF-350F-2D87E632C241}"/>
-          </ac:spMkLst>
-        </pc:spChg>
-        <pc:spChg chg="add del mod">
-          <ac:chgData name="ODERMATT Lukas" userId="0e152a97-f44b-45ff-a03a-73f06bfbf172" providerId="ADAL" clId="{E9D7B506-AC64-490E-A5CD-7DE3A2BDBBEC}" dt="2022-05-25T01:02:28.608" v="719" actId="20577"/>
-          <ac:spMkLst>
-            <pc:docMk/>
-            <pc:sldMk cId="161030841" sldId="262"/>
-            <ac:spMk id="9" creationId="{71F77BD1-AB21-483A-C26C-B79775A76353}"/>
-          </ac:spMkLst>
-        </pc:spChg>
-        <pc:spChg chg="add mod">
-          <ac:chgData name="ODERMATT Lukas" userId="0e152a97-f44b-45ff-a03a-73f06bfbf172" providerId="ADAL" clId="{E9D7B506-AC64-490E-A5CD-7DE3A2BDBBEC}" dt="2022-05-25T01:08:27.330" v="784" actId="164"/>
-          <ac:spMkLst>
-            <pc:docMk/>
-            <pc:sldMk cId="161030841" sldId="262"/>
-            <ac:spMk id="11" creationId="{1BECC981-D32F-1459-6A64-3841EF8366BE}"/>
-          </ac:spMkLst>
-        </pc:spChg>
-        <pc:grpChg chg="add mod">
-          <ac:chgData name="ODERMATT Lukas" userId="0e152a97-f44b-45ff-a03a-73f06bfbf172" providerId="ADAL" clId="{E9D7B506-AC64-490E-A5CD-7DE3A2BDBBEC}" dt="2022-05-25T01:11:43.012" v="862" actId="1076"/>
-          <ac:grpSpMkLst>
-            <pc:docMk/>
-            <pc:sldMk cId="161030841" sldId="262"/>
-            <ac:grpSpMk id="10" creationId="{FD945C2C-5947-0D95-B2E4-A09213F835B7}"/>
-          </ac:grpSpMkLst>
-        </pc:grpChg>
-        <pc:grpChg chg="add mod">
-          <ac:chgData name="ODERMATT Lukas" userId="0e152a97-f44b-45ff-a03a-73f06bfbf172" providerId="ADAL" clId="{E9D7B506-AC64-490E-A5CD-7DE3A2BDBBEC}" dt="2022-05-25T01:12:12.217" v="866" actId="1076"/>
-          <ac:grpSpMkLst>
-            <pc:docMk/>
-            <pc:sldMk cId="161030841" sldId="262"/>
-            <ac:grpSpMk id="12" creationId="{50DF3623-0072-782E-FEE8-B0E790E01F5F}"/>
-          </ac:grpSpMkLst>
-        </pc:grpChg>
-        <pc:picChg chg="add del mod modCrop">
-          <ac:chgData name="ODERMATT Lukas" userId="0e152a97-f44b-45ff-a03a-73f06bfbf172" providerId="ADAL" clId="{E9D7B506-AC64-490E-A5CD-7DE3A2BDBBEC}" dt="2022-05-25T01:00:03.312" v="638" actId="21"/>
-          <ac:picMkLst>
-            <pc:docMk/>
-            <pc:sldMk cId="161030841" sldId="262"/>
-            <ac:picMk id="7" creationId="{3322FCC2-A1F6-2321-6827-F83E3AC336F0}"/>
-          </ac:picMkLst>
-        </pc:picChg>
-        <pc:picChg chg="add mod">
-          <ac:chgData name="ODERMATT Lukas" userId="0e152a97-f44b-45ff-a03a-73f06bfbf172" providerId="ADAL" clId="{E9D7B506-AC64-490E-A5CD-7DE3A2BDBBEC}" dt="2022-05-25T01:08:27.330" v="784" actId="164"/>
-          <ac:picMkLst>
-            <pc:docMk/>
-            <pc:sldMk cId="161030841" sldId="262"/>
-            <ac:picMk id="7" creationId="{A4EF2E84-6905-A9CA-11BF-4B54367E1709}"/>
-          </ac:picMkLst>
-        </pc:picChg>
-        <pc:picChg chg="add mod">
-          <ac:chgData name="ODERMATT Lukas" userId="0e152a97-f44b-45ff-a03a-73f06bfbf172" providerId="ADAL" clId="{E9D7B506-AC64-490E-A5CD-7DE3A2BDBBEC}" dt="2022-05-25T01:02:12.608" v="717" actId="164"/>
-          <ac:picMkLst>
-            <pc:docMk/>
-            <pc:sldMk cId="161030841" sldId="262"/>
-            <ac:picMk id="8" creationId="{60713B02-B76F-241E-D98F-BCB70F52A3EB}"/>
-          </ac:picMkLst>
-        </pc:picChg>
-      </pc:sldChg>
-      <pc:sldChg chg="addSp delSp modSp new mod ord">
-        <pc:chgData name="ODERMATT Lukas" userId="0e152a97-f44b-45ff-a03a-73f06bfbf172" providerId="ADAL" clId="{E9D7B506-AC64-490E-A5CD-7DE3A2BDBBEC}" dt="2022-05-25T01:27:42.069" v="1736" actId="1076"/>
-        <pc:sldMkLst>
-          <pc:docMk/>
-          <pc:sldMk cId="2926614360" sldId="263"/>
-        </pc:sldMkLst>
-        <pc:spChg chg="mod">
-          <ac:chgData name="ODERMATT Lukas" userId="0e152a97-f44b-45ff-a03a-73f06bfbf172" providerId="ADAL" clId="{E9D7B506-AC64-490E-A5CD-7DE3A2BDBBEC}" dt="2022-05-25T01:25:03.136" v="1701" actId="20577"/>
-          <ac:spMkLst>
-            <pc:docMk/>
-            <pc:sldMk cId="2926614360" sldId="263"/>
-            <ac:spMk id="2" creationId="{D0633F95-6AAB-D82B-632B-C7F58A93D8A4}"/>
-          </ac:spMkLst>
-        </pc:spChg>
-        <pc:spChg chg="mod">
-          <ac:chgData name="ODERMATT Lukas" userId="0e152a97-f44b-45ff-a03a-73f06bfbf172" providerId="ADAL" clId="{E9D7B506-AC64-490E-A5CD-7DE3A2BDBBEC}" dt="2022-05-25T01:16:06.441" v="1195" actId="404"/>
-          <ac:spMkLst>
-            <pc:docMk/>
-            <pc:sldMk cId="2926614360" sldId="263"/>
-            <ac:spMk id="3" creationId="{F973B116-C84C-935B-9B79-76371A25CE5F}"/>
-          </ac:spMkLst>
-        </pc:spChg>
-        <pc:spChg chg="mod">
-          <ac:chgData name="ODERMATT Lukas" userId="0e152a97-f44b-45ff-a03a-73f06bfbf172" providerId="ADAL" clId="{E9D7B506-AC64-490E-A5CD-7DE3A2BDBBEC}" dt="2022-05-25T00:48:39.831" v="413" actId="207"/>
-          <ac:spMkLst>
-            <pc:docMk/>
-            <pc:sldMk cId="2926614360" sldId="263"/>
-            <ac:spMk id="4" creationId="{803FAFA2-3D87-B226-3FC9-FE9FECDD12D0}"/>
-          </ac:spMkLst>
-        </pc:spChg>
-        <pc:spChg chg="add del mod">
-          <ac:chgData name="ODERMATT Lukas" userId="0e152a97-f44b-45ff-a03a-73f06bfbf172" providerId="ADAL" clId="{E9D7B506-AC64-490E-A5CD-7DE3A2BDBBEC}" dt="2022-05-25T00:47:35.696" v="406" actId="478"/>
-          <ac:spMkLst>
-            <pc:docMk/>
-            <pc:sldMk cId="2926614360" sldId="263"/>
-            <ac:spMk id="5" creationId="{4BF16B0A-B0F2-494A-8795-CF89C8191457}"/>
-          </ac:spMkLst>
-        </pc:spChg>
-        <pc:spChg chg="add del mod">
-          <ac:chgData name="ODERMATT Lukas" userId="0e152a97-f44b-45ff-a03a-73f06bfbf172" providerId="ADAL" clId="{E9D7B506-AC64-490E-A5CD-7DE3A2BDBBEC}" dt="2022-05-25T00:35:09.036" v="302" actId="478"/>
-          <ac:spMkLst>
-            <pc:docMk/>
-            <pc:sldMk cId="2926614360" sldId="263"/>
-            <ac:spMk id="6" creationId="{4B497AE1-19EE-B9ED-832E-FD4C44596387}"/>
-          </ac:spMkLst>
-        </pc:spChg>
-        <pc:spChg chg="add mod">
-          <ac:chgData name="ODERMATT Lukas" userId="0e152a97-f44b-45ff-a03a-73f06bfbf172" providerId="ADAL" clId="{E9D7B506-AC64-490E-A5CD-7DE3A2BDBBEC}" dt="2022-05-25T00:44:13.947" v="382" actId="207"/>
-          <ac:spMkLst>
-            <pc:docMk/>
-            <pc:sldMk cId="2926614360" sldId="263"/>
-            <ac:spMk id="11" creationId="{720964B6-F032-19D5-EE78-83C1CABD47B5}"/>
-          </ac:spMkLst>
-        </pc:spChg>
-        <pc:spChg chg="add mod ord">
-          <ac:chgData name="ODERMATT Lukas" userId="0e152a97-f44b-45ff-a03a-73f06bfbf172" providerId="ADAL" clId="{E9D7B506-AC64-490E-A5CD-7DE3A2BDBBEC}" dt="2022-05-25T00:47:45.772" v="409" actId="167"/>
-          <ac:spMkLst>
-            <pc:docMk/>
-            <pc:sldMk cId="2926614360" sldId="263"/>
-            <ac:spMk id="13" creationId="{54025810-7F2E-2729-728F-DED19DA70280}"/>
-          </ac:spMkLst>
-        </pc:spChg>
-        <pc:spChg chg="add mod">
-          <ac:chgData name="ODERMATT Lukas" userId="0e152a97-f44b-45ff-a03a-73f06bfbf172" providerId="ADAL" clId="{E9D7B506-AC64-490E-A5CD-7DE3A2BDBBEC}" dt="2022-05-25T00:50:54.773" v="477"/>
-          <ac:spMkLst>
-            <pc:docMk/>
-            <pc:sldMk cId="2926614360" sldId="263"/>
-            <ac:spMk id="14" creationId="{19659565-1876-092F-D4EA-EC2393EFBD6C}"/>
-          </ac:spMkLst>
-        </pc:spChg>
-        <pc:grpChg chg="add del mod">
-          <ac:chgData name="ODERMATT Lukas" userId="0e152a97-f44b-45ff-a03a-73f06bfbf172" providerId="ADAL" clId="{E9D7B506-AC64-490E-A5CD-7DE3A2BDBBEC}" dt="2022-05-25T00:49:51.884" v="435" actId="21"/>
-          <ac:grpSpMkLst>
-            <pc:docMk/>
-            <pc:sldMk cId="2926614360" sldId="263"/>
-            <ac:grpSpMk id="12" creationId="{F9C8B8B6-2AC9-57CF-2CA6-8CC4B26FE62D}"/>
-          </ac:grpSpMkLst>
-        </pc:grpChg>
-        <pc:picChg chg="add mod">
-          <ac:chgData name="ODERMATT Lukas" userId="0e152a97-f44b-45ff-a03a-73f06bfbf172" providerId="ADAL" clId="{E9D7B506-AC64-490E-A5CD-7DE3A2BDBBEC}" dt="2022-05-25T01:27:42.069" v="1736" actId="1076"/>
-          <ac:picMkLst>
-            <pc:docMk/>
-            <pc:sldMk cId="2926614360" sldId="263"/>
-            <ac:picMk id="6" creationId="{D3C9AC76-C11E-D21A-601A-89AADABB0EF4}"/>
-          </ac:picMkLst>
-        </pc:picChg>
-        <pc:picChg chg="add del mod">
-          <ac:chgData name="ODERMATT Lukas" userId="0e152a97-f44b-45ff-a03a-73f06bfbf172" providerId="ADAL" clId="{E9D7B506-AC64-490E-A5CD-7DE3A2BDBBEC}" dt="2022-05-25T00:40:31.851" v="306" actId="478"/>
-          <ac:picMkLst>
-            <pc:docMk/>
-            <pc:sldMk cId="2926614360" sldId="263"/>
-            <ac:picMk id="8" creationId="{C7ED8F8E-C5AD-E9D1-7394-304A2EDB8E44}"/>
-          </ac:picMkLst>
-        </pc:picChg>
-        <pc:picChg chg="add mod">
-          <ac:chgData name="ODERMATT Lukas" userId="0e152a97-f44b-45ff-a03a-73f06bfbf172" providerId="ADAL" clId="{E9D7B506-AC64-490E-A5CD-7DE3A2BDBBEC}" dt="2022-05-25T00:43:18.148" v="355" actId="164"/>
-          <ac:picMkLst>
-            <pc:docMk/>
-            <pc:sldMk cId="2926614360" sldId="263"/>
-            <ac:picMk id="10" creationId="{836C1685-B1D5-27CC-BDD4-206D08EC2E16}"/>
-          </ac:picMkLst>
-        </pc:picChg>
-      </pc:sldChg>
-      <pc:sldChg chg="addSp delSp modSp add mod">
-        <pc:chgData name="ODERMATT Lukas" userId="0e152a97-f44b-45ff-a03a-73f06bfbf172" providerId="ADAL" clId="{E9D7B506-AC64-490E-A5CD-7DE3A2BDBBEC}" dt="2022-05-25T01:40:39.447" v="2243" actId="20577"/>
-        <pc:sldMkLst>
-          <pc:docMk/>
-          <pc:sldMk cId="2560109875" sldId="264"/>
-        </pc:sldMkLst>
-        <pc:spChg chg="mod">
-          <ac:chgData name="ODERMATT Lukas" userId="0e152a97-f44b-45ff-a03a-73f06bfbf172" providerId="ADAL" clId="{E9D7B506-AC64-490E-A5CD-7DE3A2BDBBEC}" dt="2022-05-25T01:20:36.514" v="1360" actId="115"/>
-          <ac:spMkLst>
-            <pc:docMk/>
-            <pc:sldMk cId="2560109875" sldId="264"/>
-            <ac:spMk id="2" creationId="{D29F7A83-12B4-9D74-5649-05240742CE19}"/>
-          </ac:spMkLst>
-        </pc:spChg>
-        <pc:spChg chg="mod">
-          <ac:chgData name="ODERMATT Lukas" userId="0e152a97-f44b-45ff-a03a-73f06bfbf172" providerId="ADAL" clId="{E9D7B506-AC64-490E-A5CD-7DE3A2BDBBEC}" dt="2022-05-25T01:40:39.447" v="2243" actId="20577"/>
-          <ac:spMkLst>
-            <pc:docMk/>
-            <pc:sldMk cId="2560109875" sldId="264"/>
-            <ac:spMk id="3" creationId="{56929CB6-1559-0DD1-B9C9-F49DB5A8FD77}"/>
-          </ac:spMkLst>
-        </pc:spChg>
-        <pc:spChg chg="mod">
-          <ac:chgData name="ODERMATT Lukas" userId="0e152a97-f44b-45ff-a03a-73f06bfbf172" providerId="ADAL" clId="{E9D7B506-AC64-490E-A5CD-7DE3A2BDBBEC}" dt="2022-05-25T01:08:38.949" v="788" actId="20577"/>
-          <ac:spMkLst>
-            <pc:docMk/>
-            <pc:sldMk cId="2560109875" sldId="264"/>
-            <ac:spMk id="8" creationId="{1DA4EAC8-D6B6-BCB7-BE91-A1BAB55D07A5}"/>
-          </ac:spMkLst>
-        </pc:spChg>
-        <pc:spChg chg="mod">
-          <ac:chgData name="ODERMATT Lukas" userId="0e152a97-f44b-45ff-a03a-73f06bfbf172" providerId="ADAL" clId="{E9D7B506-AC64-490E-A5CD-7DE3A2BDBBEC}" dt="2022-05-25T01:08:41.266" v="790" actId="20577"/>
-          <ac:spMkLst>
-            <pc:docMk/>
-            <pc:sldMk cId="2560109875" sldId="264"/>
-            <ac:spMk id="11" creationId="{3F662669-2742-1563-226C-FE7E39EE4E21}"/>
-          </ac:spMkLst>
-        </pc:spChg>
-        <pc:spChg chg="add mod">
-          <ac:chgData name="ODERMATT Lukas" userId="0e152a97-f44b-45ff-a03a-73f06bfbf172" providerId="ADAL" clId="{E9D7B506-AC64-490E-A5CD-7DE3A2BDBBEC}" dt="2022-05-25T01:09:43.644" v="821" actId="164"/>
-          <ac:spMkLst>
-            <pc:docMk/>
-            <pc:sldMk cId="2560109875" sldId="264"/>
-            <ac:spMk id="14" creationId="{78ACE1B6-DF7E-2A99-FC26-7DF2E0C07E22}"/>
-          </ac:spMkLst>
-        </pc:spChg>
-        <pc:spChg chg="mod">
-          <ac:chgData name="ODERMATT Lukas" userId="0e152a97-f44b-45ff-a03a-73f06bfbf172" providerId="ADAL" clId="{E9D7B506-AC64-490E-A5CD-7DE3A2BDBBEC}" dt="2022-05-25T01:36:20.874" v="2122" actId="20577"/>
-          <ac:spMkLst>
-            <pc:docMk/>
-            <pc:sldMk cId="2560109875" sldId="264"/>
-            <ac:spMk id="18" creationId="{9A6D412C-DB74-BDDE-FA6C-AF6DEF92A57A}"/>
-          </ac:spMkLst>
-        </pc:spChg>
-        <pc:grpChg chg="add mod">
-          <ac:chgData name="ODERMATT Lukas" userId="0e152a97-f44b-45ff-a03a-73f06bfbf172" providerId="ADAL" clId="{E9D7B506-AC64-490E-A5CD-7DE3A2BDBBEC}" dt="2022-05-25T01:11:45.870" v="863" actId="1076"/>
-          <ac:grpSpMkLst>
-            <pc:docMk/>
-            <pc:sldMk cId="2560109875" sldId="264"/>
-            <ac:grpSpMk id="6" creationId="{560D7538-190B-1B64-B09C-EE8E15F082E7}"/>
-          </ac:grpSpMkLst>
-        </pc:grpChg>
-        <pc:grpChg chg="add del mod">
-          <ac:chgData name="ODERMATT Lukas" userId="0e152a97-f44b-45ff-a03a-73f06bfbf172" providerId="ADAL" clId="{E9D7B506-AC64-490E-A5CD-7DE3A2BDBBEC}" dt="2022-05-25T01:09:02.012" v="796" actId="478"/>
-          <ac:grpSpMkLst>
-            <pc:docMk/>
-            <pc:sldMk cId="2560109875" sldId="264"/>
-            <ac:grpSpMk id="9" creationId="{10CF0C43-F196-6E5C-8A0E-B0EB6A3550BF}"/>
-          </ac:grpSpMkLst>
-        </pc:grpChg>
-        <pc:grpChg chg="add mod">
-          <ac:chgData name="ODERMATT Lukas" userId="0e152a97-f44b-45ff-a03a-73f06bfbf172" providerId="ADAL" clId="{E9D7B506-AC64-490E-A5CD-7DE3A2BDBBEC}" dt="2022-05-25T01:11:54.276" v="864" actId="1076"/>
-          <ac:grpSpMkLst>
-            <pc:docMk/>
-            <pc:sldMk cId="2560109875" sldId="264"/>
-            <ac:grpSpMk id="15" creationId="{E85B670B-DDC6-E059-ED2F-A65EFABC95CC}"/>
-          </ac:grpSpMkLst>
-        </pc:grpChg>
-        <pc:grpChg chg="add mod">
-          <ac:chgData name="ODERMATT Lukas" userId="0e152a97-f44b-45ff-a03a-73f06bfbf172" providerId="ADAL" clId="{E9D7B506-AC64-490E-A5CD-7DE3A2BDBBEC}" dt="2022-05-25T01:12:07.672" v="865" actId="1076"/>
-          <ac:grpSpMkLst>
-            <pc:docMk/>
-            <pc:sldMk cId="2560109875" sldId="264"/>
-            <ac:grpSpMk id="16" creationId="{1CDA91D2-C4B8-B090-644A-34199801A0B5}"/>
-          </ac:grpSpMkLst>
-        </pc:grpChg>
-        <pc:picChg chg="mod">
-          <ac:chgData name="ODERMATT Lukas" userId="0e152a97-f44b-45ff-a03a-73f06bfbf172" providerId="ADAL" clId="{E9D7B506-AC64-490E-A5CD-7DE3A2BDBBEC}" dt="2022-05-25T00:49:55.313" v="436"/>
-          <ac:picMkLst>
-            <pc:docMk/>
-            <pc:sldMk cId="2560109875" sldId="264"/>
-            <ac:picMk id="7" creationId="{99A94803-940B-3FB3-F7DE-BA85E7E93149}"/>
-          </ac:picMkLst>
-        </pc:picChg>
-        <pc:picChg chg="add del mod">
-          <ac:chgData name="ODERMATT Lukas" userId="0e152a97-f44b-45ff-a03a-73f06bfbf172" providerId="ADAL" clId="{E9D7B506-AC64-490E-A5CD-7DE3A2BDBBEC}" dt="2022-05-25T01:00:48.546" v="654" actId="21"/>
-          <ac:picMkLst>
-            <pc:docMk/>
-            <pc:sldMk cId="2560109875" sldId="264"/>
-            <ac:picMk id="9" creationId="{1ABFFB02-1B38-CD6E-8EEC-8F65A2B1E2D4}"/>
-          </ac:picMkLst>
-        </pc:picChg>
-        <pc:picChg chg="mod">
-          <ac:chgData name="ODERMATT Lukas" userId="0e152a97-f44b-45ff-a03a-73f06bfbf172" providerId="ADAL" clId="{E9D7B506-AC64-490E-A5CD-7DE3A2BDBBEC}" dt="2022-05-25T01:08:35.074" v="786"/>
-          <ac:picMkLst>
-            <pc:docMk/>
-            <pc:sldMk cId="2560109875" sldId="264"/>
-            <ac:picMk id="10" creationId="{B424D272-8398-27F9-E545-0EBBE20CA7FD}"/>
-          </ac:picMkLst>
-        </pc:picChg>
-        <pc:picChg chg="add mod">
-          <ac:chgData name="ODERMATT Lukas" userId="0e152a97-f44b-45ff-a03a-73f06bfbf172" providerId="ADAL" clId="{E9D7B506-AC64-490E-A5CD-7DE3A2BDBBEC}" dt="2022-05-25T01:09:43.644" v="821" actId="164"/>
-          <ac:picMkLst>
-            <pc:docMk/>
-            <pc:sldMk cId="2560109875" sldId="264"/>
-            <ac:picMk id="13" creationId="{87E91511-3FBD-42B6-63C6-CB78F90FF623}"/>
-          </ac:picMkLst>
-        </pc:picChg>
-        <pc:picChg chg="mod">
-          <ac:chgData name="ODERMATT Lukas" userId="0e152a97-f44b-45ff-a03a-73f06bfbf172" providerId="ADAL" clId="{E9D7B506-AC64-490E-A5CD-7DE3A2BDBBEC}" dt="2022-05-25T01:11:10.420" v="857"/>
-          <ac:picMkLst>
-            <pc:docMk/>
-            <pc:sldMk cId="2560109875" sldId="264"/>
-            <ac:picMk id="17" creationId="{74EBB8A7-A624-E0B2-2A47-67376293D8D2}"/>
-          </ac:picMkLst>
-        </pc:picChg>
-      </pc:sldChg>
-      <pc:sldChg chg="addSp delSp modSp add del mod">
-        <pc:chgData name="ODERMATT Lukas" userId="0e152a97-f44b-45ff-a03a-73f06bfbf172" providerId="ADAL" clId="{E9D7B506-AC64-490E-A5CD-7DE3A2BDBBEC}" dt="2022-05-25T01:14:31.369" v="1048" actId="47"/>
-        <pc:sldMkLst>
-          <pc:docMk/>
-          <pc:sldMk cId="973612530" sldId="265"/>
-        </pc:sldMkLst>
-        <pc:spChg chg="mod">
-          <ac:chgData name="ODERMATT Lukas" userId="0e152a97-f44b-45ff-a03a-73f06bfbf172" providerId="ADAL" clId="{E9D7B506-AC64-490E-A5CD-7DE3A2BDBBEC}" dt="2022-05-25T00:50:08.870" v="447" actId="20577"/>
-          <ac:spMkLst>
-            <pc:docMk/>
-            <pc:sldMk cId="973612530" sldId="265"/>
-            <ac:spMk id="3" creationId="{56929CB6-1559-0DD1-B9C9-F49DB5A8FD77}"/>
-          </ac:spMkLst>
-        </pc:spChg>
-        <pc:spChg chg="add mod">
-          <ac:chgData name="ODERMATT Lukas" userId="0e152a97-f44b-45ff-a03a-73f06bfbf172" providerId="ADAL" clId="{E9D7B506-AC64-490E-A5CD-7DE3A2BDBBEC}" dt="2022-05-25T01:11:07.001" v="855" actId="164"/>
-          <ac:spMkLst>
-            <pc:docMk/>
-            <pc:sldMk cId="973612530" sldId="265"/>
-            <ac:spMk id="8" creationId="{9EEE39E7-B0C7-559B-0D1B-A2DFB8CE4B96}"/>
-          </ac:spMkLst>
-        </pc:spChg>
-        <pc:grpChg chg="add del mod">
-          <ac:chgData name="ODERMATT Lukas" userId="0e152a97-f44b-45ff-a03a-73f06bfbf172" providerId="ADAL" clId="{E9D7B506-AC64-490E-A5CD-7DE3A2BDBBEC}" dt="2022-05-25T01:11:08.986" v="856" actId="21"/>
-          <ac:grpSpMkLst>
-            <pc:docMk/>
-            <pc:sldMk cId="973612530" sldId="265"/>
-            <ac:grpSpMk id="9" creationId="{F09BD78A-9284-E581-3491-7FE3E71A5BB5}"/>
-          </ac:grpSpMkLst>
-        </pc:grpChg>
-        <pc:picChg chg="add mod">
-          <ac:chgData name="ODERMATT Lukas" userId="0e152a97-f44b-45ff-a03a-73f06bfbf172" providerId="ADAL" clId="{E9D7B506-AC64-490E-A5CD-7DE3A2BDBBEC}" dt="2022-05-25T01:11:07.001" v="855" actId="164"/>
-          <ac:picMkLst>
-            <pc:docMk/>
-            <pc:sldMk cId="973612530" sldId="265"/>
-            <ac:picMk id="7" creationId="{E5D959F9-5A1C-6492-D1CA-2F8CFDAFF9E6}"/>
-          </ac:picMkLst>
-        </pc:picChg>
-      </pc:sldChg>
-      <pc:sldChg chg="add del">
-        <pc:chgData name="ODERMATT Lukas" userId="0e152a97-f44b-45ff-a03a-73f06bfbf172" providerId="ADAL" clId="{E9D7B506-AC64-490E-A5CD-7DE3A2BDBBEC}" dt="2022-05-25T00:50:23.132" v="472" actId="47"/>
-        <pc:sldMkLst>
-          <pc:docMk/>
-          <pc:sldMk cId="739635441" sldId="266"/>
-        </pc:sldMkLst>
-      </pc:sldChg>
-      <pc:sldChg chg="addSp modSp add mod">
-        <pc:chgData name="ODERMATT Lukas" userId="0e152a97-f44b-45ff-a03a-73f06bfbf172" providerId="ADAL" clId="{E9D7B506-AC64-490E-A5CD-7DE3A2BDBBEC}" dt="2022-05-25T01:25:11.094" v="1704" actId="20577"/>
-        <pc:sldMkLst>
-          <pc:docMk/>
-          <pc:sldMk cId="2359831458" sldId="267"/>
-        </pc:sldMkLst>
-        <pc:spChg chg="mod">
-          <ac:chgData name="ODERMATT Lukas" userId="0e152a97-f44b-45ff-a03a-73f06bfbf172" providerId="ADAL" clId="{E9D7B506-AC64-490E-A5CD-7DE3A2BDBBEC}" dt="2022-05-25T01:25:11.094" v="1704" actId="20577"/>
-          <ac:spMkLst>
-            <pc:docMk/>
-            <pc:sldMk cId="2359831458" sldId="267"/>
-            <ac:spMk id="2" creationId="{D29F7A83-12B4-9D74-5649-05240742CE19}"/>
-          </ac:spMkLst>
-        </pc:spChg>
-        <pc:spChg chg="mod">
-          <ac:chgData name="ODERMATT Lukas" userId="0e152a97-f44b-45ff-a03a-73f06bfbf172" providerId="ADAL" clId="{E9D7B506-AC64-490E-A5CD-7DE3A2BDBBEC}" dt="2022-05-25T00:50:20.015" v="471" actId="20577"/>
-          <ac:spMkLst>
-            <pc:docMk/>
-            <pc:sldMk cId="2359831458" sldId="267"/>
-            <ac:spMk id="3" creationId="{56929CB6-1559-0DD1-B9C9-F49DB5A8FD77}"/>
-          </ac:spMkLst>
-        </pc:spChg>
-        <pc:spChg chg="add mod">
-          <ac:chgData name="ODERMATT Lukas" userId="0e152a97-f44b-45ff-a03a-73f06bfbf172" providerId="ADAL" clId="{E9D7B506-AC64-490E-A5CD-7DE3A2BDBBEC}" dt="2022-05-25T00:51:06.885" v="478"/>
-          <ac:spMkLst>
-            <pc:docMk/>
-            <pc:sldMk cId="2359831458" sldId="267"/>
-            <ac:spMk id="6" creationId="{704AB728-31D4-BBCE-EB2D-AF4E22A47A60}"/>
-          </ac:spMkLst>
-        </pc:spChg>
-      </pc:sldChg>
-      <pc:sldChg chg="modSp add mod ord">
-        <pc:chgData name="ODERMATT Lukas" userId="0e152a97-f44b-45ff-a03a-73f06bfbf172" providerId="ADAL" clId="{E9D7B506-AC64-490E-A5CD-7DE3A2BDBBEC}" dt="2022-05-25T01:23:40.176" v="1653" actId="207"/>
-        <pc:sldMkLst>
-          <pc:docMk/>
-          <pc:sldMk cId="2278168890" sldId="268"/>
-        </pc:sldMkLst>
-        <pc:spChg chg="mod">
-          <ac:chgData name="ODERMATT Lukas" userId="0e152a97-f44b-45ff-a03a-73f06bfbf172" providerId="ADAL" clId="{E9D7B506-AC64-490E-A5CD-7DE3A2BDBBEC}" dt="2022-05-25T01:20:39.445" v="1361" actId="115"/>
-          <ac:spMkLst>
-            <pc:docMk/>
-            <pc:sldMk cId="2278168890" sldId="268"/>
-            <ac:spMk id="2" creationId="{D29F7A83-12B4-9D74-5649-05240742CE19}"/>
-          </ac:spMkLst>
-        </pc:spChg>
-        <pc:spChg chg="mod">
-          <ac:chgData name="ODERMATT Lukas" userId="0e152a97-f44b-45ff-a03a-73f06bfbf172" providerId="ADAL" clId="{E9D7B506-AC64-490E-A5CD-7DE3A2BDBBEC}" dt="2022-05-25T01:23:40.176" v="1653" actId="207"/>
-          <ac:spMkLst>
-            <pc:docMk/>
-            <pc:sldMk cId="2278168890" sldId="268"/>
-            <ac:spMk id="3" creationId="{56929CB6-1559-0DD1-B9C9-F49DB5A8FD77}"/>
-          </ac:spMkLst>
-        </pc:spChg>
-      </pc:sldChg>
-      <pc:sldChg chg="add">
-        <pc:chgData name="ODERMATT Lukas" userId="0e152a97-f44b-45ff-a03a-73f06bfbf172" providerId="ADAL" clId="{E9D7B506-AC64-490E-A5CD-7DE3A2BDBBEC}" dt="2022-05-25T00:50:25.218" v="474"/>
-        <pc:sldMkLst>
-          <pc:docMk/>
-          <pc:sldMk cId="1480768486" sldId="269"/>
-        </pc:sldMkLst>
-      </pc:sldChg>
-      <pc:sldChg chg="add">
-        <pc:chgData name="ODERMATT Lukas" userId="0e152a97-f44b-45ff-a03a-73f06bfbf172" providerId="ADAL" clId="{E9D7B506-AC64-490E-A5CD-7DE3A2BDBBEC}" dt="2022-05-25T00:50:25.371" v="475"/>
-        <pc:sldMkLst>
-          <pc:docMk/>
-          <pc:sldMk cId="2909995064" sldId="270"/>
-        </pc:sldMkLst>
-      </pc:sldChg>
-      <pc:sldChg chg="modSp add mod ord">
-        <pc:chgData name="ODERMATT Lukas" userId="0e152a97-f44b-45ff-a03a-73f06bfbf172" providerId="ADAL" clId="{E9D7B506-AC64-490E-A5CD-7DE3A2BDBBEC}" dt="2022-05-25T01:30:10.277" v="1779" actId="20577"/>
-        <pc:sldMkLst>
-          <pc:docMk/>
-          <pc:sldMk cId="1095777582" sldId="271"/>
-        </pc:sldMkLst>
-        <pc:spChg chg="mod">
-          <ac:chgData name="ODERMATT Lukas" userId="0e152a97-f44b-45ff-a03a-73f06bfbf172" providerId="ADAL" clId="{E9D7B506-AC64-490E-A5CD-7DE3A2BDBBEC}" dt="2022-05-25T01:20:08.833" v="1354" actId="20577"/>
-          <ac:spMkLst>
-            <pc:docMk/>
-            <pc:sldMk cId="1095777582" sldId="271"/>
-            <ac:spMk id="2" creationId="{D29F7A83-12B4-9D74-5649-05240742CE19}"/>
-          </ac:spMkLst>
-        </pc:spChg>
-        <pc:spChg chg="mod">
-          <ac:chgData name="ODERMATT Lukas" userId="0e152a97-f44b-45ff-a03a-73f06bfbf172" providerId="ADAL" clId="{E9D7B506-AC64-490E-A5CD-7DE3A2BDBBEC}" dt="2022-05-25T01:30:10.277" v="1779" actId="20577"/>
-          <ac:spMkLst>
-            <pc:docMk/>
-            <pc:sldMk cId="1095777582" sldId="271"/>
-            <ac:spMk id="3" creationId="{56929CB6-1559-0DD1-B9C9-F49DB5A8FD77}"/>
-          </ac:spMkLst>
-        </pc:spChg>
-      </pc:sldChg>
-      <pc:sldChg chg="modSp add mod ord">
-        <pc:chgData name="ODERMATT Lukas" userId="0e152a97-f44b-45ff-a03a-73f06bfbf172" providerId="ADAL" clId="{E9D7B506-AC64-490E-A5CD-7DE3A2BDBBEC}" dt="2022-05-25T01:25:37.440" v="1715" actId="20577"/>
-        <pc:sldMkLst>
-          <pc:docMk/>
-          <pc:sldMk cId="824736450" sldId="272"/>
-        </pc:sldMkLst>
-        <pc:spChg chg="mod">
-          <ac:chgData name="ODERMATT Lukas" userId="0e152a97-f44b-45ff-a03a-73f06bfbf172" providerId="ADAL" clId="{E9D7B506-AC64-490E-A5CD-7DE3A2BDBBEC}" dt="2022-05-25T01:25:37.440" v="1715" actId="20577"/>
-          <ac:spMkLst>
-            <pc:docMk/>
-            <pc:sldMk cId="824736450" sldId="272"/>
-            <ac:spMk id="2" creationId="{D29F7A83-12B4-9D74-5649-05240742CE19}"/>
-          </ac:spMkLst>
-        </pc:spChg>
-      </pc:sldChg>
-      <pc:sldChg chg="add del">
-        <pc:chgData name="ODERMATT Lukas" userId="0e152a97-f44b-45ff-a03a-73f06bfbf172" providerId="ADAL" clId="{E9D7B506-AC64-490E-A5CD-7DE3A2BDBBEC}" dt="2022-05-25T01:00:45.379" v="652"/>
-        <pc:sldMkLst>
-          <pc:docMk/>
-          <pc:sldMk cId="2213968890" sldId="272"/>
-        </pc:sldMkLst>
-      </pc:sldChg>
-      <pc:sldChg chg="add del">
-        <pc:chgData name="ODERMATT Lukas" userId="0e152a97-f44b-45ff-a03a-73f06bfbf172" providerId="ADAL" clId="{E9D7B506-AC64-490E-A5CD-7DE3A2BDBBEC}" dt="2022-05-25T01:00:45.379" v="652"/>
-        <pc:sldMkLst>
-          <pc:docMk/>
-          <pc:sldMk cId="267753453" sldId="273"/>
-        </pc:sldMkLst>
-      </pc:sldChg>
-      <pc:sldChg chg="add">
-        <pc:chgData name="ODERMATT Lukas" userId="0e152a97-f44b-45ff-a03a-73f06bfbf172" providerId="ADAL" clId="{E9D7B506-AC64-490E-A5CD-7DE3A2BDBBEC}" dt="2022-05-25T01:17:53.237" v="1214"/>
-        <pc:sldMkLst>
-          <pc:docMk/>
-          <pc:sldMk cId="1342685859" sldId="273"/>
-        </pc:sldMkLst>
-      </pc:sldChg>
-      <pc:sldChg chg="add">
-        <pc:chgData name="ODERMATT Lukas" userId="0e152a97-f44b-45ff-a03a-73f06bfbf172" providerId="ADAL" clId="{E9D7B506-AC64-490E-A5CD-7DE3A2BDBBEC}" dt="2022-05-25T01:17:55.626" v="1215"/>
-        <pc:sldMkLst>
-          <pc:docMk/>
-          <pc:sldMk cId="1623559362" sldId="274"/>
-        </pc:sldMkLst>
-      </pc:sldChg>
-      <pc:sldChg chg="add">
-        <pc:chgData name="ODERMATT Lukas" userId="0e152a97-f44b-45ff-a03a-73f06bfbf172" providerId="ADAL" clId="{E9D7B506-AC64-490E-A5CD-7DE3A2BDBBEC}" dt="2022-05-25T01:17:57.033" v="1216"/>
-        <pc:sldMkLst>
-          <pc:docMk/>
-          <pc:sldMk cId="3881927796" sldId="275"/>
-        </pc:sldMkLst>
-      </pc:sldChg>
-      <pc:sldChg chg="add">
-        <pc:chgData name="ODERMATT Lukas" userId="0e152a97-f44b-45ff-a03a-73f06bfbf172" providerId="ADAL" clId="{E9D7B506-AC64-490E-A5CD-7DE3A2BDBBEC}" dt="2022-05-25T01:17:57.301" v="1217"/>
-        <pc:sldMkLst>
-          <pc:docMk/>
-          <pc:sldMk cId="4183993755" sldId="276"/>
-        </pc:sldMkLst>
-      </pc:sldChg>
-      <pc:sldChg chg="modSp add mod ord">
-        <pc:chgData name="ODERMATT Lukas" userId="0e152a97-f44b-45ff-a03a-73f06bfbf172" providerId="ADAL" clId="{E9D7B506-AC64-490E-A5CD-7DE3A2BDBBEC}" dt="2022-05-25T01:25:49.195" v="1720" actId="114"/>
-        <pc:sldMkLst>
-          <pc:docMk/>
-          <pc:sldMk cId="3336591187" sldId="277"/>
-        </pc:sldMkLst>
-        <pc:spChg chg="mod">
-          <ac:chgData name="ODERMATT Lukas" userId="0e152a97-f44b-45ff-a03a-73f06bfbf172" providerId="ADAL" clId="{E9D7B506-AC64-490E-A5CD-7DE3A2BDBBEC}" dt="2022-05-25T01:25:49.195" v="1720" actId="114"/>
-          <ac:spMkLst>
-            <pc:docMk/>
-            <pc:sldMk cId="3336591187" sldId="277"/>
-            <ac:spMk id="2" creationId="{D29F7A83-12B4-9D74-5649-05240742CE19}"/>
-          </ac:spMkLst>
-        </pc:spChg>
-      </pc:sldChg>
-      <pc:sldChg chg="add ord">
-        <pc:chgData name="ODERMATT Lukas" userId="0e152a97-f44b-45ff-a03a-73f06bfbf172" providerId="ADAL" clId="{E9D7B506-AC64-490E-A5CD-7DE3A2BDBBEC}" dt="2022-05-25T01:18:38.613" v="1280"/>
-        <pc:sldMkLst>
-          <pc:docMk/>
-          <pc:sldMk cId="662193684" sldId="278"/>
-        </pc:sldMkLst>
-      </pc:sldChg>
-      <pc:sldChg chg="add">
-        <pc:chgData name="ODERMATT Lukas" userId="0e152a97-f44b-45ff-a03a-73f06bfbf172" providerId="ADAL" clId="{E9D7B506-AC64-490E-A5CD-7DE3A2BDBBEC}" dt="2022-05-25T01:18:39.074" v="1281"/>
-        <pc:sldMkLst>
-          <pc:docMk/>
-          <pc:sldMk cId="1908477047" sldId="279"/>
-        </pc:sldMkLst>
-      </pc:sldChg>
-      <pc:sldChg chg="add">
-        <pc:chgData name="ODERMATT Lukas" userId="0e152a97-f44b-45ff-a03a-73f06bfbf172" providerId="ADAL" clId="{E9D7B506-AC64-490E-A5CD-7DE3A2BDBBEC}" dt="2022-05-25T01:18:39.412" v="1282"/>
-        <pc:sldMkLst>
-          <pc:docMk/>
-          <pc:sldMk cId="1929192034" sldId="280"/>
-        </pc:sldMkLst>
-      </pc:sldChg>
-      <pc:sldChg chg="modSp add mod ord">
-        <pc:chgData name="ODERMATT Lukas" userId="0e152a97-f44b-45ff-a03a-73f06bfbf172" providerId="ADAL" clId="{E9D7B506-AC64-490E-A5CD-7DE3A2BDBBEC}" dt="2022-05-25T01:19:45.050" v="1353" actId="20577"/>
-        <pc:sldMkLst>
-          <pc:docMk/>
-          <pc:sldMk cId="1174336444" sldId="281"/>
-        </pc:sldMkLst>
-        <pc:spChg chg="mod">
-          <ac:chgData name="ODERMATT Lukas" userId="0e152a97-f44b-45ff-a03a-73f06bfbf172" providerId="ADAL" clId="{E9D7B506-AC64-490E-A5CD-7DE3A2BDBBEC}" dt="2022-05-25T01:19:16.981" v="1330" actId="20577"/>
-          <ac:spMkLst>
-            <pc:docMk/>
-            <pc:sldMk cId="1174336444" sldId="281"/>
-            <ac:spMk id="2" creationId="{F5506FFC-BFC8-3A03-36F3-4CB4AAD9FC09}"/>
-          </ac:spMkLst>
-        </pc:spChg>
-        <pc:spChg chg="mod">
-          <ac:chgData name="ODERMATT Lukas" userId="0e152a97-f44b-45ff-a03a-73f06bfbf172" providerId="ADAL" clId="{E9D7B506-AC64-490E-A5CD-7DE3A2BDBBEC}" dt="2022-05-25T01:19:45.050" v="1353" actId="20577"/>
-          <ac:spMkLst>
-            <pc:docMk/>
-            <pc:sldMk cId="1174336444" sldId="281"/>
-            <ac:spMk id="3" creationId="{70000830-A958-CD48-57DC-47192C1DD2DE}"/>
-          </ac:spMkLst>
-        </pc:spChg>
-      </pc:sldChg>
-      <pc:sldChg chg="modSp add mod ord">
-        <pc:chgData name="ODERMATT Lukas" userId="0e152a97-f44b-45ff-a03a-73f06bfbf172" providerId="ADAL" clId="{E9D7B506-AC64-490E-A5CD-7DE3A2BDBBEC}" dt="2022-05-25T12:07:07.082" v="2317" actId="20577"/>
-        <pc:sldMkLst>
-          <pc:docMk/>
-          <pc:sldMk cId="3085853753" sldId="282"/>
-        </pc:sldMkLst>
-        <pc:spChg chg="mod">
-          <ac:chgData name="ODERMATT Lukas" userId="0e152a97-f44b-45ff-a03a-73f06bfbf172" providerId="ADAL" clId="{E9D7B506-AC64-490E-A5CD-7DE3A2BDBBEC}" dt="2022-05-25T12:07:07.082" v="2317" actId="20577"/>
-          <ac:spMkLst>
-            <pc:docMk/>
-            <pc:sldMk cId="3085853753" sldId="282"/>
-            <ac:spMk id="2" creationId="{D29F7A83-12B4-9D74-5649-05240742CE19}"/>
-          </ac:spMkLst>
-        </pc:spChg>
-      </pc:sldChg>
-      <pc:sldChg chg="add ord">
-        <pc:chgData name="ODERMATT Lukas" userId="0e152a97-f44b-45ff-a03a-73f06bfbf172" providerId="ADAL" clId="{E9D7B506-AC64-490E-A5CD-7DE3A2BDBBEC}" dt="2022-05-25T01:24:49.473" v="1697"/>
-        <pc:sldMkLst>
-          <pc:docMk/>
-          <pc:sldMk cId="3426358072" sldId="283"/>
-        </pc:sldMkLst>
-      </pc:sldChg>
-      <pc:sldChg chg="add">
-        <pc:chgData name="ODERMATT Lukas" userId="0e152a97-f44b-45ff-a03a-73f06bfbf172" providerId="ADAL" clId="{E9D7B506-AC64-490E-A5CD-7DE3A2BDBBEC}" dt="2022-05-25T01:24:49.752" v="1698"/>
-        <pc:sldMkLst>
-          <pc:docMk/>
-          <pc:sldMk cId="1845617045" sldId="284"/>
-        </pc:sldMkLst>
-      </pc:sldChg>
-    </pc:docChg>
-  </pc:docChgLst>
-</pc:chgInfo>
-</file>
-
 <file path=ppt/notesMasters/notesMaster1.xml><?xml version="1.0" encoding="utf-8"?>
 <p:notesMaster xmlns:a="http://schemas.openxmlformats.org/drawingml/2006/main" xmlns:r="http://schemas.openxmlformats.org/officeDocument/2006/relationships" xmlns:p="http://schemas.openxmlformats.org/presentationml/2006/main">
   <p:cSld>
@@ -949,7 +197,7 @@
             </a:lvl1pPr>
           </a:lstStyle>
           <a:p>
-            <a:endParaRPr lang="en-GB"/>
+            <a:endParaRPr lang="en-GB" dirty="0"/>
           </a:p>
         </p:txBody>
       </p:sp>
@@ -982,9 +230,9 @@
           <a:p>
             <a:fld id="{798E3D03-6BB1-4E8B-AEFD-D58DDCAFA619}" type="datetimeFigureOut">
               <a:rPr lang="en-GB" smtClean="0"/>
-              <a:t>27/05/2022</a:t>
+              <a:t>30/05/2022</a:t>
             </a:fld>
-            <a:endParaRPr lang="en-GB"/>
+            <a:endParaRPr lang="en-GB" dirty="0"/>
           </a:p>
         </p:txBody>
       </p:sp>
@@ -1017,7 +265,7 @@
           <a:bodyPr vert="horz" lIns="91440" tIns="45720" rIns="91440" bIns="45720" rtlCol="0" anchor="ctr"/>
           <a:lstStyle/>
           <a:p>
-            <a:endParaRPr lang="en-GB"/>
+            <a:endParaRPr lang="en-GB" dirty="0"/>
           </a:p>
         </p:txBody>
       </p:sp>
@@ -1108,7 +356,7 @@
             </a:lvl1pPr>
           </a:lstStyle>
           <a:p>
-            <a:endParaRPr lang="en-GB"/>
+            <a:endParaRPr lang="en-GB" dirty="0"/>
           </a:p>
         </p:txBody>
       </p:sp>
@@ -1143,7 +391,7 @@
               <a:rPr lang="en-GB" smtClean="0"/>
               <a:t>‹Nr.›</a:t>
             </a:fld>
-            <a:endParaRPr lang="en-GB"/>
+            <a:endParaRPr lang="en-GB" dirty="0"/>
           </a:p>
         </p:txBody>
       </p:sp>
@@ -1399,9 +647,9 @@
           <a:p>
             <a:fld id="{E5FD23AC-3380-4E1C-B46F-D96C5D53F69C}" type="datetime1">
               <a:rPr lang="en-US" smtClean="0"/>
-              <a:t>5/27/2022</a:t>
+              <a:t>5/30/2022</a:t>
             </a:fld>
-            <a:endParaRPr lang="en-US"/>
+            <a:endParaRPr lang="en-US" dirty="0"/>
           </a:p>
         </p:txBody>
       </p:sp>
@@ -1426,7 +674,7 @@
           <a:bodyPr/>
           <a:lstStyle/>
           <a:p>
-            <a:endParaRPr lang="en-US"/>
+            <a:endParaRPr lang="en-US" dirty="0"/>
           </a:p>
         </p:txBody>
       </p:sp>
@@ -1455,7 +703,7 @@
               <a:rPr lang="en-US" smtClean="0"/>
               <a:t>‹Nr.›</a:t>
             </a:fld>
-            <a:endParaRPr lang="en-US"/>
+            <a:endParaRPr lang="en-US" dirty="0"/>
           </a:p>
         </p:txBody>
       </p:sp>
@@ -1599,9 +847,9 @@
           <a:p>
             <a:fld id="{357586AA-8F40-4881-938C-6E6BD2AE7728}" type="datetime1">
               <a:rPr lang="en-US" smtClean="0"/>
-              <a:t>5/27/2022</a:t>
+              <a:t>5/30/2022</a:t>
             </a:fld>
-            <a:endParaRPr lang="en-US"/>
+            <a:endParaRPr lang="en-US" dirty="0"/>
           </a:p>
         </p:txBody>
       </p:sp>
@@ -1626,7 +874,7 @@
           <a:bodyPr/>
           <a:lstStyle/>
           <a:p>
-            <a:endParaRPr lang="en-US"/>
+            <a:endParaRPr lang="en-US" dirty="0"/>
           </a:p>
         </p:txBody>
       </p:sp>
@@ -1655,7 +903,7 @@
               <a:rPr lang="en-US" smtClean="0"/>
               <a:t>‹Nr.›</a:t>
             </a:fld>
-            <a:endParaRPr lang="en-US"/>
+            <a:endParaRPr lang="en-US" dirty="0"/>
           </a:p>
         </p:txBody>
       </p:sp>
@@ -1809,9 +1057,9 @@
           <a:p>
             <a:fld id="{D536A684-BDCE-46EA-B805-627EC3E6768C}" type="datetime1">
               <a:rPr lang="en-US" smtClean="0"/>
-              <a:t>5/27/2022</a:t>
+              <a:t>5/30/2022</a:t>
             </a:fld>
-            <a:endParaRPr lang="en-US"/>
+            <a:endParaRPr lang="en-US" dirty="0"/>
           </a:p>
         </p:txBody>
       </p:sp>
@@ -1836,7 +1084,7 @@
           <a:bodyPr/>
           <a:lstStyle/>
           <a:p>
-            <a:endParaRPr lang="en-US"/>
+            <a:endParaRPr lang="en-US" dirty="0"/>
           </a:p>
         </p:txBody>
       </p:sp>
@@ -1865,7 +1113,7 @@
               <a:rPr lang="en-US" smtClean="0"/>
               <a:t>‹Nr.›</a:t>
             </a:fld>
-            <a:endParaRPr lang="en-US"/>
+            <a:endParaRPr lang="en-US" dirty="0"/>
           </a:p>
         </p:txBody>
       </p:sp>
@@ -2009,9 +1257,9 @@
           <a:p>
             <a:fld id="{B4E8D3CB-082F-48B6-BC28-54F208CA9A04}" type="datetime1">
               <a:rPr lang="en-US" smtClean="0"/>
-              <a:t>5/27/2022</a:t>
+              <a:t>5/30/2022</a:t>
             </a:fld>
-            <a:endParaRPr lang="en-US"/>
+            <a:endParaRPr lang="en-US" dirty="0"/>
           </a:p>
         </p:txBody>
       </p:sp>
@@ -2036,7 +1284,7 @@
           <a:bodyPr/>
           <a:lstStyle/>
           <a:p>
-            <a:endParaRPr lang="en-US"/>
+            <a:endParaRPr lang="en-US" dirty="0"/>
           </a:p>
         </p:txBody>
       </p:sp>
@@ -2065,7 +1313,7 @@
               <a:rPr lang="en-US" smtClean="0"/>
               <a:t>‹Nr.›</a:t>
             </a:fld>
-            <a:endParaRPr lang="en-US"/>
+            <a:endParaRPr lang="en-US" dirty="0"/>
           </a:p>
         </p:txBody>
       </p:sp>
@@ -2285,9 +1533,9 @@
           <a:p>
             <a:fld id="{81907AE0-B4B2-4F02-8FE1-C48F50A7A312}" type="datetime1">
               <a:rPr lang="en-US" smtClean="0"/>
-              <a:t>5/27/2022</a:t>
+              <a:t>5/30/2022</a:t>
             </a:fld>
-            <a:endParaRPr lang="en-US"/>
+            <a:endParaRPr lang="en-US" dirty="0"/>
           </a:p>
         </p:txBody>
       </p:sp>
@@ -2312,7 +1560,7 @@
           <a:bodyPr/>
           <a:lstStyle/>
           <a:p>
-            <a:endParaRPr lang="en-US"/>
+            <a:endParaRPr lang="en-US" dirty="0"/>
           </a:p>
         </p:txBody>
       </p:sp>
@@ -2341,7 +1589,7 @@
               <a:rPr lang="en-US" smtClean="0"/>
               <a:t>‹Nr.›</a:t>
             </a:fld>
-            <a:endParaRPr lang="en-US"/>
+            <a:endParaRPr lang="en-US" dirty="0"/>
           </a:p>
         </p:txBody>
       </p:sp>
@@ -2553,9 +1801,9 @@
           <a:p>
             <a:fld id="{CC6A78C3-B542-482E-8867-5033290DCE88}" type="datetime1">
               <a:rPr lang="en-US" smtClean="0"/>
-              <a:t>5/27/2022</a:t>
+              <a:t>5/30/2022</a:t>
             </a:fld>
-            <a:endParaRPr lang="en-US"/>
+            <a:endParaRPr lang="en-US" dirty="0"/>
           </a:p>
         </p:txBody>
       </p:sp>
@@ -2580,7 +1828,7 @@
           <a:bodyPr/>
           <a:lstStyle/>
           <a:p>
-            <a:endParaRPr lang="en-US"/>
+            <a:endParaRPr lang="en-US" dirty="0"/>
           </a:p>
         </p:txBody>
       </p:sp>
@@ -2609,7 +1857,7 @@
               <a:rPr lang="en-US" smtClean="0"/>
               <a:t>‹Nr.›</a:t>
             </a:fld>
-            <a:endParaRPr lang="en-US"/>
+            <a:endParaRPr lang="en-US" dirty="0"/>
           </a:p>
         </p:txBody>
       </p:sp>
@@ -2968,9 +2216,9 @@
           <a:p>
             <a:fld id="{C7ECA7FE-1BF4-4F82-A444-680FDAE69B4A}" type="datetime1">
               <a:rPr lang="en-US" smtClean="0"/>
-              <a:t>5/27/2022</a:t>
+              <a:t>5/30/2022</a:t>
             </a:fld>
-            <a:endParaRPr lang="en-US"/>
+            <a:endParaRPr lang="en-US" dirty="0"/>
           </a:p>
         </p:txBody>
       </p:sp>
@@ -2995,7 +2243,7 @@
           <a:bodyPr/>
           <a:lstStyle/>
           <a:p>
-            <a:endParaRPr lang="en-US"/>
+            <a:endParaRPr lang="en-US" dirty="0"/>
           </a:p>
         </p:txBody>
       </p:sp>
@@ -3024,7 +2272,7 @@
               <a:rPr lang="en-US" smtClean="0"/>
               <a:t>‹Nr.›</a:t>
             </a:fld>
-            <a:endParaRPr lang="en-US"/>
+            <a:endParaRPr lang="en-US" dirty="0"/>
           </a:p>
         </p:txBody>
       </p:sp>
@@ -3110,9 +2358,9 @@
           <a:p>
             <a:fld id="{4813E7FD-110F-43E0-903E-3132E750135F}" type="datetime1">
               <a:rPr lang="en-US" smtClean="0"/>
-              <a:t>5/27/2022</a:t>
+              <a:t>5/30/2022</a:t>
             </a:fld>
-            <a:endParaRPr lang="en-US"/>
+            <a:endParaRPr lang="en-US" dirty="0"/>
           </a:p>
         </p:txBody>
       </p:sp>
@@ -3137,7 +2385,7 @@
           <a:bodyPr/>
           <a:lstStyle/>
           <a:p>
-            <a:endParaRPr lang="en-US"/>
+            <a:endParaRPr lang="en-US" dirty="0"/>
           </a:p>
         </p:txBody>
       </p:sp>
@@ -3166,7 +2414,7 @@
               <a:rPr lang="en-US" smtClean="0"/>
               <a:t>‹Nr.›</a:t>
             </a:fld>
-            <a:endParaRPr lang="en-US"/>
+            <a:endParaRPr lang="en-US" dirty="0"/>
           </a:p>
         </p:txBody>
       </p:sp>
@@ -3223,9 +2471,9 @@
           <a:p>
             <a:fld id="{BDBC415F-6ACC-4E00-85A7-5FFDE68EB84C}" type="datetime1">
               <a:rPr lang="en-US" smtClean="0"/>
-              <a:t>5/27/2022</a:t>
+              <a:t>5/30/2022</a:t>
             </a:fld>
-            <a:endParaRPr lang="en-US"/>
+            <a:endParaRPr lang="en-US" dirty="0"/>
           </a:p>
         </p:txBody>
       </p:sp>
@@ -3250,7 +2498,7 @@
           <a:bodyPr/>
           <a:lstStyle/>
           <a:p>
-            <a:endParaRPr lang="en-US"/>
+            <a:endParaRPr lang="en-US" dirty="0"/>
           </a:p>
         </p:txBody>
       </p:sp>
@@ -3279,7 +2527,7 @@
               <a:rPr lang="en-US" smtClean="0"/>
               <a:t>‹Nr.›</a:t>
             </a:fld>
-            <a:endParaRPr lang="en-US"/>
+            <a:endParaRPr lang="en-US" dirty="0"/>
           </a:p>
         </p:txBody>
       </p:sp>
@@ -3536,9 +2784,9 @@
           <a:p>
             <a:fld id="{ACB196A5-AE60-4E03-B64A-211A67598798}" type="datetime1">
               <a:rPr lang="en-US" smtClean="0"/>
-              <a:t>5/27/2022</a:t>
+              <a:t>5/30/2022</a:t>
             </a:fld>
-            <a:endParaRPr lang="en-US"/>
+            <a:endParaRPr lang="en-US" dirty="0"/>
           </a:p>
         </p:txBody>
       </p:sp>
@@ -3563,7 +2811,7 @@
           <a:bodyPr/>
           <a:lstStyle/>
           <a:p>
-            <a:endParaRPr lang="en-US"/>
+            <a:endParaRPr lang="en-US" dirty="0"/>
           </a:p>
         </p:txBody>
       </p:sp>
@@ -3592,7 +2840,7 @@
               <a:rPr lang="en-US" smtClean="0"/>
               <a:t>‹Nr.›</a:t>
             </a:fld>
-            <a:endParaRPr lang="en-US"/>
+            <a:endParaRPr lang="en-US" dirty="0"/>
           </a:p>
         </p:txBody>
       </p:sp>
@@ -3727,7 +2975,7 @@
             </a:lvl9pPr>
           </a:lstStyle>
           <a:p>
-            <a:endParaRPr lang="en-US"/>
+            <a:endParaRPr lang="en-US" dirty="0"/>
           </a:p>
         </p:txBody>
       </p:sp>
@@ -3825,9 +3073,9 @@
           <a:p>
             <a:fld id="{E1736CA9-5EBE-4D02-8A4F-04FA61D34D3A}" type="datetime1">
               <a:rPr lang="en-US" smtClean="0"/>
-              <a:t>5/27/2022</a:t>
+              <a:t>5/30/2022</a:t>
             </a:fld>
-            <a:endParaRPr lang="en-US"/>
+            <a:endParaRPr lang="en-US" dirty="0"/>
           </a:p>
         </p:txBody>
       </p:sp>
@@ -3852,7 +3100,7 @@
           <a:bodyPr/>
           <a:lstStyle/>
           <a:p>
-            <a:endParaRPr lang="en-US"/>
+            <a:endParaRPr lang="en-US" dirty="0"/>
           </a:p>
         </p:txBody>
       </p:sp>
@@ -3881,7 +3129,7 @@
               <a:rPr lang="en-US" smtClean="0"/>
               <a:t>‹Nr.›</a:t>
             </a:fld>
-            <a:endParaRPr lang="en-US"/>
+            <a:endParaRPr lang="en-US" dirty="0"/>
           </a:p>
         </p:txBody>
       </p:sp>
@@ -4068,9 +3316,9 @@
           <a:p>
             <a:fld id="{95E2E09A-0856-49F1-8A49-CD7C39870C37}" type="datetime1">
               <a:rPr lang="en-US" smtClean="0"/>
-              <a:t>5/27/2022</a:t>
+              <a:t>5/30/2022</a:t>
             </a:fld>
-            <a:endParaRPr lang="en-US"/>
+            <a:endParaRPr lang="en-US" dirty="0"/>
           </a:p>
         </p:txBody>
       </p:sp>
@@ -4113,7 +3361,7 @@
             </a:lvl1pPr>
           </a:lstStyle>
           <a:p>
-            <a:endParaRPr lang="en-US"/>
+            <a:endParaRPr lang="en-US" dirty="0"/>
           </a:p>
         </p:txBody>
       </p:sp>
@@ -4160,7 +3408,7 @@
               <a:rPr lang="en-US" smtClean="0"/>
               <a:t>‹Nr.›</a:t>
             </a:fld>
-            <a:endParaRPr lang="en-US"/>
+            <a:endParaRPr lang="en-US" dirty="0"/>
           </a:p>
         </p:txBody>
       </p:sp>
@@ -4592,7 +3840,7 @@
           <a:lstStyle/>
           <a:p>
             <a:pPr algn="ctr"/>
-            <a:endParaRPr lang="en-GB"/>
+            <a:endParaRPr lang="en-GB" dirty="0"/>
           </a:p>
         </p:txBody>
       </p:sp>
@@ -4646,7 +3894,7 @@
           <a:lstStyle/>
           <a:p>
             <a:pPr algn="ctr"/>
-            <a:endParaRPr lang="en-GB"/>
+            <a:endParaRPr lang="en-GB" dirty="0"/>
           </a:p>
         </p:txBody>
       </p:sp>
@@ -5759,22 +5007,62 @@
         </p:nvSpPr>
         <p:spPr/>
         <p:txBody>
-          <a:bodyPr/>
+          <a:bodyPr>
+            <a:normAutofit/>
+          </a:bodyPr>
           <a:lstStyle/>
           <a:p>
             <a:r>
               <a:rPr lang="en-GB" dirty="0"/>
-              <a:t>Add one</a:t>
-            </a:r>
-          </a:p>
-          <a:p>
+              <a:t>Main thread is baking bread and selling those bread afterwards</a:t>
+            </a:r>
+          </a:p>
+          <a:p>
+            <a:r>
+              <a:rPr lang="en-GB" dirty="0"/>
+              <a:t>When selling bread: </a:t>
+            </a:r>
+          </a:p>
+          <a:p>
+            <a:pPr lvl="1"/>
+            <a:r>
+              <a:rPr lang="en-GB" dirty="0"/>
+              <a:t>Decide if we want to donate bread as too good to go</a:t>
+            </a:r>
+          </a:p>
+          <a:p>
+            <a:pPr lvl="1"/>
+            <a:r>
+              <a:rPr lang="en-GB" dirty="0"/>
+              <a:t>Don’t donate on every bread sold</a:t>
+            </a:r>
+          </a:p>
+          <a:p>
+            <a:pPr lvl="1"/>
+            <a:r>
+              <a:rPr lang="en-GB" dirty="0"/>
+              <a:t>After selling, evaluate a flag if its time for a donation</a:t>
+            </a:r>
+          </a:p>
+          <a:p>
+            <a:pPr lvl="1"/>
+            <a:r>
+              <a:rPr lang="en-GB" dirty="0"/>
+              <a:t>If flag is set, donate bread as too good to go and reset the flag</a:t>
+            </a:r>
+          </a:p>
+          <a:p>
+            <a:pPr lvl="1"/>
             <a:endParaRPr lang="en-GB" dirty="0"/>
           </a:p>
           <a:p>
             <a:r>
               <a:rPr lang="en-GB" dirty="0"/>
-              <a:t>Add two</a:t>
-            </a:r>
+              <a:t>Run a second thread (the “coordinator”) which will set the too good to go-flag</a:t>
+            </a:r>
+          </a:p>
+          <a:p>
+            <a:endParaRPr lang="en-GB" dirty="0"/>
           </a:p>
           <a:p>
             <a:endParaRPr lang="en-GB" dirty="0"/>
@@ -5985,7 +5273,7 @@
           <a:p>
             <a:r>
               <a:rPr lang="en-GB" dirty="0"/>
-              <a:t>Template</a:t>
+              <a:t>Too good to go: Main thread and coordinator</a:t>
             </a:r>
           </a:p>
         </p:txBody>
@@ -6013,20 +5301,66 @@
           <a:p>
             <a:r>
               <a:rPr lang="en-GB" dirty="0"/>
-              <a:t>Add one</a:t>
-            </a:r>
-          </a:p>
-          <a:p>
-            <a:endParaRPr lang="en-GB" dirty="0"/>
-          </a:p>
-          <a:p>
+              <a:t>Main thread:</a:t>
+            </a:r>
+          </a:p>
+          <a:p>
+            <a:pPr marL="971550" lvl="1" indent="-514350">
+              <a:buAutoNum type="arabicPeriod"/>
+            </a:pPr>
             <a:r>
               <a:rPr lang="en-GB" dirty="0"/>
-              <a:t>Add two</a:t>
-            </a:r>
-          </a:p>
-          <a:p>
-            <a:endParaRPr lang="en-GB" dirty="0"/>
+              <a:t>Initialize the data structures </a:t>
+            </a:r>
+          </a:p>
+          <a:p>
+            <a:pPr marL="971550" lvl="1" indent="-514350">
+              <a:buAutoNum type="arabicPeriod"/>
+            </a:pPr>
+            <a:r>
+              <a:rPr lang="en-GB" dirty="0"/>
+              <a:t>Create a mutex to protect the too-good-to-go flag</a:t>
+            </a:r>
+          </a:p>
+          <a:p>
+            <a:pPr marL="971550" lvl="1" indent="-514350">
+              <a:buAutoNum type="arabicPeriod"/>
+            </a:pPr>
+            <a:r>
+              <a:rPr lang="en-GB" dirty="0"/>
+              <a:t>Start the coordinator-thread</a:t>
+            </a:r>
+          </a:p>
+          <a:p>
+            <a:pPr marL="971550" lvl="1" indent="-514350">
+              <a:buAutoNum type="arabicPeriod"/>
+            </a:pPr>
+            <a:r>
+              <a:rPr lang="en-GB" dirty="0"/>
+              <a:t>Bake requested amount of bread</a:t>
+            </a:r>
+          </a:p>
+          <a:p>
+            <a:pPr marL="971550" lvl="1" indent="-514350">
+              <a:buAutoNum type="arabicPeriod"/>
+            </a:pPr>
+            <a:r>
+              <a:rPr lang="en-GB" dirty="0"/>
+              <a:t>Sell bread and make </a:t>
+            </a:r>
+            <a:br>
+              <a:rPr lang="en-GB" dirty="0"/>
+            </a:br>
+            <a:r>
+              <a:rPr lang="en-GB" dirty="0"/>
+              <a:t>too-good-to-go decisions</a:t>
+            </a:r>
+          </a:p>
+          <a:p>
+            <a:r>
+              <a:rPr lang="en-GB" dirty="0"/>
+              <a:t>Coordinator: Simply set the flag:</a:t>
+            </a:r>
           </a:p>
           <a:p>
             <a:endParaRPr lang="en-GB" dirty="0"/>
@@ -6073,6 +5407,126 @@
           </a:p>
         </p:txBody>
       </p:sp>
+      <p:pic>
+        <p:nvPicPr>
+          <p:cNvPr id="7" name="Grafik 6">
+            <a:extLst>
+              <a:ext uri="{FF2B5EF4-FFF2-40B4-BE49-F238E27FC236}">
+                <a16:creationId xmlns:a16="http://schemas.microsoft.com/office/drawing/2014/main" id="{EC458DE3-DC28-7DA3-F28E-7294034DD7F9}"/>
+              </a:ext>
+            </a:extLst>
+          </p:cNvPr>
+          <p:cNvPicPr>
+            <a:picLocks noChangeAspect="1"/>
+          </p:cNvPicPr>
+          <p:nvPr/>
+        </p:nvPicPr>
+        <p:blipFill>
+          <a:blip r:embed="rId2"/>
+          <a:stretch>
+            <a:fillRect/>
+          </a:stretch>
+        </p:blipFill>
+        <p:spPr>
+          <a:xfrm>
+            <a:off x="7329062" y="1775308"/>
+            <a:ext cx="3326418" cy="643946"/>
+          </a:xfrm>
+          <a:prstGeom prst="rect">
+            <a:avLst/>
+          </a:prstGeom>
+        </p:spPr>
+      </p:pic>
+      <p:pic>
+        <p:nvPicPr>
+          <p:cNvPr id="9" name="Grafik 8">
+            <a:extLst>
+              <a:ext uri="{FF2B5EF4-FFF2-40B4-BE49-F238E27FC236}">
+                <a16:creationId xmlns:a16="http://schemas.microsoft.com/office/drawing/2014/main" id="{2D877972-502E-E9D8-F602-1153E97D6C72}"/>
+              </a:ext>
+            </a:extLst>
+          </p:cNvPr>
+          <p:cNvPicPr>
+            <a:picLocks noChangeAspect="1"/>
+          </p:cNvPicPr>
+          <p:nvPr/>
+        </p:nvPicPr>
+        <p:blipFill>
+          <a:blip r:embed="rId3"/>
+          <a:stretch>
+            <a:fillRect/>
+          </a:stretch>
+        </p:blipFill>
+        <p:spPr>
+          <a:xfrm>
+            <a:off x="5938291" y="3085576"/>
+            <a:ext cx="4717189" cy="438188"/>
+          </a:xfrm>
+          <a:prstGeom prst="rect">
+            <a:avLst/>
+          </a:prstGeom>
+        </p:spPr>
+      </p:pic>
+      <p:pic>
+        <p:nvPicPr>
+          <p:cNvPr id="11" name="Grafik 10">
+            <a:extLst>
+              <a:ext uri="{FF2B5EF4-FFF2-40B4-BE49-F238E27FC236}">
+                <a16:creationId xmlns:a16="http://schemas.microsoft.com/office/drawing/2014/main" id="{745748E9-022A-0ED1-B7CD-B2283E926C2A}"/>
+              </a:ext>
+            </a:extLst>
+          </p:cNvPr>
+          <p:cNvPicPr>
+            <a:picLocks noChangeAspect="1"/>
+          </p:cNvPicPr>
+          <p:nvPr/>
+        </p:nvPicPr>
+        <p:blipFill>
+          <a:blip r:embed="rId4"/>
+          <a:stretch>
+            <a:fillRect/>
+          </a:stretch>
+        </p:blipFill>
+        <p:spPr>
+          <a:xfrm>
+            <a:off x="6833719" y="3539849"/>
+            <a:ext cx="3821761" cy="3181626"/>
+          </a:xfrm>
+          <a:prstGeom prst="rect">
+            <a:avLst/>
+          </a:prstGeom>
+        </p:spPr>
+      </p:pic>
+      <p:pic>
+        <p:nvPicPr>
+          <p:cNvPr id="13" name="Grafik 12">
+            <a:extLst>
+              <a:ext uri="{FF2B5EF4-FFF2-40B4-BE49-F238E27FC236}">
+                <a16:creationId xmlns:a16="http://schemas.microsoft.com/office/drawing/2014/main" id="{1942B0AB-47F5-088E-B9F8-D670AC54C9DF}"/>
+              </a:ext>
+            </a:extLst>
+          </p:cNvPr>
+          <p:cNvPicPr>
+            <a:picLocks noChangeAspect="1"/>
+          </p:cNvPicPr>
+          <p:nvPr/>
+        </p:nvPicPr>
+        <p:blipFill>
+          <a:blip r:embed="rId5"/>
+          <a:stretch>
+            <a:fillRect/>
+          </a:stretch>
+        </p:blipFill>
+        <p:spPr>
+          <a:xfrm>
+            <a:off x="1174749" y="5048740"/>
+            <a:ext cx="3261643" cy="1672735"/>
+          </a:xfrm>
+          <a:prstGeom prst="rect">
+            <a:avLst/>
+          </a:prstGeom>
+        </p:spPr>
+      </p:pic>
     </p:spTree>
     <p:extLst>
       <p:ext uri="{BB962C8B-B14F-4D97-AF65-F5344CB8AC3E}">
@@ -6153,7 +5607,7 @@
           <a:lstStyle/>
           <a:p>
             <a:pPr algn="ctr"/>
-            <a:endParaRPr lang="en-GB"/>
+            <a:endParaRPr lang="en-GB" dirty="0"/>
           </a:p>
         </p:txBody>
       </p:sp>
@@ -6180,7 +5634,7 @@
           <a:p>
             <a:r>
               <a:rPr lang="en-GB" dirty="0"/>
-              <a:t>Template</a:t>
+              <a:t>Too good to go: Different strategies</a:t>
             </a:r>
           </a:p>
         </p:txBody>
@@ -6203,22 +5657,73 @@
         </p:nvSpPr>
         <p:spPr/>
         <p:txBody>
-          <a:bodyPr/>
+          <a:bodyPr>
+            <a:normAutofit/>
+          </a:bodyPr>
           <a:lstStyle/>
           <a:p>
             <a:r>
               <a:rPr lang="en-GB" dirty="0"/>
-              <a:t>Add one</a:t>
-            </a:r>
-          </a:p>
-          <a:p>
+              <a:t>Donate old bread: First in, first out</a:t>
+            </a:r>
+          </a:p>
+          <a:p>
+            <a:pPr lvl="1"/>
+            <a:r>
+              <a:rPr lang="en-GB" dirty="0"/>
+              <a:t>Every bread baked, is stored together with its bakery timestamp</a:t>
+            </a:r>
+          </a:p>
+          <a:p>
+            <a:pPr lvl="1"/>
+            <a:r>
+              <a:rPr lang="en-GB" dirty="0"/>
+              <a:t>The inventory stores the timestamp of the oldest bread </a:t>
+            </a:r>
+            <a:br>
+              <a:rPr lang="en-GB" dirty="0"/>
+            </a:br>
+            <a:r>
+              <a:rPr lang="en-GB" dirty="0"/>
+              <a:t>for every bread-type</a:t>
+            </a:r>
+          </a:p>
+          <a:p>
+            <a:pPr lvl="1"/>
+            <a:r>
+              <a:rPr lang="en-GB" dirty="0"/>
+              <a:t>On donate, evaluate current time (minus some grace-period) and oldest-bread-time: Donate all “old” bread</a:t>
+            </a:r>
+          </a:p>
+          <a:p>
+            <a:r>
+              <a:rPr lang="en-GB" dirty="0"/>
+              <a:t>Second chance: </a:t>
+            </a:r>
+          </a:p>
+          <a:p>
+            <a:pPr lvl="1"/>
+            <a:r>
+              <a:rPr lang="en-GB" dirty="0"/>
+              <a:t>Similar, but we remember in the inventory if a bread-type was</a:t>
+            </a:r>
+            <a:br>
+              <a:rPr lang="en-GB" dirty="0"/>
+            </a:br>
+            <a:r>
+              <a:rPr lang="en-GB" dirty="0"/>
+              <a:t>sold recently. If not, we donate old bread of that type.</a:t>
+            </a:r>
+          </a:p>
+          <a:p>
+            <a:pPr lvl="1"/>
             <a:endParaRPr lang="en-GB" dirty="0"/>
           </a:p>
           <a:p>
-            <a:r>
-              <a:rPr lang="en-GB" dirty="0"/>
-              <a:t>Add two</a:t>
-            </a:r>
+            <a:endParaRPr lang="en-GB" dirty="0"/>
+          </a:p>
+          <a:p>
+            <a:endParaRPr lang="en-GB" dirty="0"/>
           </a:p>
           <a:p>
             <a:endParaRPr lang="en-GB" dirty="0"/>
@@ -6268,6 +5773,156 @@
           </a:p>
         </p:txBody>
       </p:sp>
+      <p:pic>
+        <p:nvPicPr>
+          <p:cNvPr id="9" name="Grafik 8">
+            <a:extLst>
+              <a:ext uri="{FF2B5EF4-FFF2-40B4-BE49-F238E27FC236}">
+                <a16:creationId xmlns:a16="http://schemas.microsoft.com/office/drawing/2014/main" id="{0421B189-7ABF-31C8-4E30-6CF6759E6BA3}"/>
+              </a:ext>
+            </a:extLst>
+          </p:cNvPr>
+          <p:cNvPicPr>
+            <a:picLocks noChangeAspect="1"/>
+          </p:cNvPicPr>
+          <p:nvPr/>
+        </p:nvPicPr>
+        <p:blipFill>
+          <a:blip r:embed="rId2"/>
+          <a:stretch>
+            <a:fillRect/>
+          </a:stretch>
+        </p:blipFill>
+        <p:spPr>
+          <a:xfrm>
+            <a:off x="9625742" y="2350445"/>
+            <a:ext cx="1767993" cy="723963"/>
+          </a:xfrm>
+          <a:prstGeom prst="rect">
+            <a:avLst/>
+          </a:prstGeom>
+        </p:spPr>
+      </p:pic>
+      <p:pic>
+        <p:nvPicPr>
+          <p:cNvPr id="11" name="Grafik 10">
+            <a:extLst>
+              <a:ext uri="{FF2B5EF4-FFF2-40B4-BE49-F238E27FC236}">
+                <a16:creationId xmlns:a16="http://schemas.microsoft.com/office/drawing/2014/main" id="{1991DC20-912B-FD95-8489-23D7165D2B99}"/>
+              </a:ext>
+            </a:extLst>
+          </p:cNvPr>
+          <p:cNvPicPr>
+            <a:picLocks noChangeAspect="1"/>
+          </p:cNvPicPr>
+          <p:nvPr/>
+        </p:nvPicPr>
+        <p:blipFill>
+          <a:blip r:embed="rId3"/>
+          <a:stretch>
+            <a:fillRect/>
+          </a:stretch>
+        </p:blipFill>
+        <p:spPr>
+          <a:xfrm>
+            <a:off x="6880472" y="3734165"/>
+            <a:ext cx="4473328" cy="754445"/>
+          </a:xfrm>
+          <a:prstGeom prst="rect">
+            <a:avLst/>
+          </a:prstGeom>
+        </p:spPr>
+      </p:pic>
+      <p:pic>
+        <p:nvPicPr>
+          <p:cNvPr id="13" name="Grafik 12">
+            <a:extLst>
+              <a:ext uri="{FF2B5EF4-FFF2-40B4-BE49-F238E27FC236}">
+                <a16:creationId xmlns:a16="http://schemas.microsoft.com/office/drawing/2014/main" id="{437D155D-AC55-8CA2-F373-1E092A29B041}"/>
+              </a:ext>
+            </a:extLst>
+          </p:cNvPr>
+          <p:cNvPicPr>
+            <a:picLocks noChangeAspect="1"/>
+          </p:cNvPicPr>
+          <p:nvPr/>
+        </p:nvPicPr>
+        <p:blipFill>
+          <a:blip r:embed="rId4"/>
+          <a:stretch>
+            <a:fillRect/>
+          </a:stretch>
+        </p:blipFill>
+        <p:spPr>
+          <a:xfrm>
+            <a:off x="9663108" y="4667997"/>
+            <a:ext cx="1710838" cy="1276461"/>
+          </a:xfrm>
+          <a:prstGeom prst="rect">
+            <a:avLst/>
+          </a:prstGeom>
+        </p:spPr>
+      </p:pic>
+      <p:pic>
+        <p:nvPicPr>
+          <p:cNvPr id="15" name="Grafik 14">
+            <a:extLst>
+              <a:ext uri="{FF2B5EF4-FFF2-40B4-BE49-F238E27FC236}">
+                <a16:creationId xmlns:a16="http://schemas.microsoft.com/office/drawing/2014/main" id="{A636F291-133D-CC7D-D703-C22BEE110366}"/>
+              </a:ext>
+            </a:extLst>
+          </p:cNvPr>
+          <p:cNvPicPr>
+            <a:picLocks noChangeAspect="1"/>
+          </p:cNvPicPr>
+          <p:nvPr/>
+        </p:nvPicPr>
+        <p:blipFill>
+          <a:blip r:embed="rId5"/>
+          <a:stretch>
+            <a:fillRect/>
+          </a:stretch>
+        </p:blipFill>
+        <p:spPr>
+          <a:xfrm>
+            <a:off x="1598340" y="5407201"/>
+            <a:ext cx="2339543" cy="537257"/>
+          </a:xfrm>
+          <a:prstGeom prst="rect">
+            <a:avLst/>
+          </a:prstGeom>
+        </p:spPr>
+      </p:pic>
+      <p:pic>
+        <p:nvPicPr>
+          <p:cNvPr id="17" name="Grafik 16">
+            <a:extLst>
+              <a:ext uri="{FF2B5EF4-FFF2-40B4-BE49-F238E27FC236}">
+                <a16:creationId xmlns:a16="http://schemas.microsoft.com/office/drawing/2014/main" id="{64B4447F-0EA9-14B5-B399-E1534932951C}"/>
+              </a:ext>
+            </a:extLst>
+          </p:cNvPr>
+          <p:cNvPicPr>
+            <a:picLocks noChangeAspect="1"/>
+          </p:cNvPicPr>
+          <p:nvPr/>
+        </p:nvPicPr>
+        <p:blipFill>
+          <a:blip r:embed="rId6"/>
+          <a:stretch>
+            <a:fillRect/>
+          </a:stretch>
+        </p:blipFill>
+        <p:spPr>
+          <a:xfrm>
+            <a:off x="5939372" y="5418707"/>
+            <a:ext cx="2880610" cy="758256"/>
+          </a:xfrm>
+          <a:prstGeom prst="rect">
+            <a:avLst/>
+          </a:prstGeom>
+        </p:spPr>
+      </p:pic>
     </p:spTree>
     <p:extLst>
       <p:ext uri="{BB962C8B-B14F-4D97-AF65-F5344CB8AC3E}">
@@ -6348,7 +6003,7 @@
           <a:lstStyle/>
           <a:p>
             <a:pPr algn="ctr"/>
-            <a:endParaRPr lang="en-GB"/>
+            <a:endParaRPr lang="en-GB" dirty="0"/>
           </a:p>
         </p:txBody>
       </p:sp>
@@ -6375,7 +6030,11 @@
           <a:p>
             <a:r>
               <a:rPr lang="en-GB" dirty="0"/>
-              <a:t>Template</a:t>
+              <a:t>4) Additional Feature – </a:t>
+            </a:r>
+            <a:r>
+              <a:rPr lang="en-GB" i="1" dirty="0"/>
+              <a:t>Sleeping Baker</a:t>
             </a:r>
           </a:p>
         </p:txBody>
@@ -6403,7 +6062,7 @@
           <a:p>
             <a:r>
               <a:rPr lang="en-GB" dirty="0"/>
-              <a:t>Add one</a:t>
+              <a:t>Timing</a:t>
             </a:r>
           </a:p>
           <a:p>
@@ -6454,205 +6113,6 @@
                 </a:solidFill>
               </a:rPr>
               <a:t>18</a:t>
-            </a:fld>
-            <a:endParaRPr lang="en-US" dirty="0">
-              <a:solidFill>
-                <a:schemeClr val="bg1"/>
-              </a:solidFill>
-            </a:endParaRPr>
-          </a:p>
-        </p:txBody>
-      </p:sp>
-    </p:spTree>
-    <p:extLst>
-      <p:ext uri="{BB962C8B-B14F-4D97-AF65-F5344CB8AC3E}">
-        <p14:creationId xmlns:p14="http://schemas.microsoft.com/office/powerpoint/2010/main" val="4183993755"/>
-      </p:ext>
-    </p:extLst>
-  </p:cSld>
-  <p:clrMapOvr>
-    <a:masterClrMapping/>
-  </p:clrMapOvr>
-</p:sld>
-</file>
-
-<file path=ppt/slides/slide19.xml><?xml version="1.0" encoding="utf-8"?>
-<p:sld xmlns:a="http://schemas.openxmlformats.org/drawingml/2006/main" xmlns:r="http://schemas.openxmlformats.org/officeDocument/2006/relationships" xmlns:p="http://schemas.openxmlformats.org/presentationml/2006/main">
-  <p:cSld>
-    <p:spTree>
-      <p:nvGrpSpPr>
-        <p:cNvPr id="1" name=""/>
-        <p:cNvGrpSpPr/>
-        <p:nvPr/>
-      </p:nvGrpSpPr>
-      <p:grpSpPr>
-        <a:xfrm>
-          <a:off x="0" y="0"/>
-          <a:ext cx="0" cy="0"/>
-          <a:chOff x="0" y="0"/>
-          <a:chExt cx="0" cy="0"/>
-        </a:xfrm>
-      </p:grpSpPr>
-      <p:sp>
-        <p:nvSpPr>
-          <p:cNvPr id="5" name="Rechteck 4">
-            <a:extLst>
-              <a:ext uri="{FF2B5EF4-FFF2-40B4-BE49-F238E27FC236}">
-                <a16:creationId xmlns:a16="http://schemas.microsoft.com/office/drawing/2014/main" id="{FE9C6FD6-FE65-42AF-350F-2D87E632C241}"/>
-              </a:ext>
-            </a:extLst>
-          </p:cNvPr>
-          <p:cNvSpPr/>
-          <p:nvPr/>
-        </p:nvSpPr>
-        <p:spPr>
-          <a:xfrm rot="2700000">
-            <a:off x="11278276" y="4661925"/>
-            <a:ext cx="459165" cy="3209464"/>
-          </a:xfrm>
-          <a:prstGeom prst="rect">
-            <a:avLst/>
-          </a:prstGeom>
-          <a:solidFill>
-            <a:srgbClr val="7030A0"/>
-          </a:solidFill>
-          <a:ln>
-            <a:solidFill>
-              <a:schemeClr val="tx1"/>
-            </a:solidFill>
-          </a:ln>
-        </p:spPr>
-        <p:style>
-          <a:lnRef idx="2">
-            <a:schemeClr val="accent1">
-              <a:shade val="50000"/>
-            </a:schemeClr>
-          </a:lnRef>
-          <a:fillRef idx="1">
-            <a:schemeClr val="accent1"/>
-          </a:fillRef>
-          <a:effectRef idx="0">
-            <a:schemeClr val="accent1"/>
-          </a:effectRef>
-          <a:fontRef idx="minor">
-            <a:schemeClr val="lt1"/>
-          </a:fontRef>
-        </p:style>
-        <p:txBody>
-          <a:bodyPr rtlCol="0" anchor="ctr"/>
-          <a:lstStyle/>
-          <a:p>
-            <a:pPr algn="ctr"/>
-            <a:endParaRPr lang="en-GB"/>
-          </a:p>
-        </p:txBody>
-      </p:sp>
-      <p:sp>
-        <p:nvSpPr>
-          <p:cNvPr id="2" name="Titel 1">
-            <a:extLst>
-              <a:ext uri="{FF2B5EF4-FFF2-40B4-BE49-F238E27FC236}">
-                <a16:creationId xmlns:a16="http://schemas.microsoft.com/office/drawing/2014/main" id="{D29F7A83-12B4-9D74-5649-05240742CE19}"/>
-              </a:ext>
-            </a:extLst>
-          </p:cNvPr>
-          <p:cNvSpPr>
-            <a:spLocks noGrp="1"/>
-          </p:cNvSpPr>
-          <p:nvPr>
-            <p:ph type="title"/>
-          </p:nvPr>
-        </p:nvSpPr>
-        <p:spPr/>
-        <p:txBody>
-          <a:bodyPr/>
-          <a:lstStyle/>
-          <a:p>
-            <a:r>
-              <a:rPr lang="en-GB" dirty="0"/>
-              <a:t>4) Additional Feature – </a:t>
-            </a:r>
-            <a:r>
-              <a:rPr lang="en-GB" i="1" dirty="0"/>
-              <a:t>Sleeping Baker</a:t>
-            </a:r>
-          </a:p>
-        </p:txBody>
-      </p:sp>
-      <p:sp>
-        <p:nvSpPr>
-          <p:cNvPr id="3" name="Inhaltsplatzhalter 2">
-            <a:extLst>
-              <a:ext uri="{FF2B5EF4-FFF2-40B4-BE49-F238E27FC236}">
-                <a16:creationId xmlns:a16="http://schemas.microsoft.com/office/drawing/2014/main" id="{56929CB6-1559-0DD1-B9C9-F49DB5A8FD77}"/>
-              </a:ext>
-            </a:extLst>
-          </p:cNvPr>
-          <p:cNvSpPr>
-            <a:spLocks noGrp="1"/>
-          </p:cNvSpPr>
-          <p:nvPr>
-            <p:ph idx="1"/>
-          </p:nvPr>
-        </p:nvSpPr>
-        <p:spPr/>
-        <p:txBody>
-          <a:bodyPr/>
-          <a:lstStyle/>
-          <a:p>
-            <a:r>
-              <a:rPr lang="en-GB" dirty="0"/>
-              <a:t>Timing</a:t>
-            </a:r>
-          </a:p>
-          <a:p>
-            <a:endParaRPr lang="en-GB" dirty="0"/>
-          </a:p>
-          <a:p>
-            <a:r>
-              <a:rPr lang="en-GB" dirty="0"/>
-              <a:t>Add two</a:t>
-            </a:r>
-          </a:p>
-          <a:p>
-            <a:endParaRPr lang="en-GB" dirty="0"/>
-          </a:p>
-          <a:p>
-            <a:endParaRPr lang="en-GB" dirty="0"/>
-          </a:p>
-          <a:p>
-            <a:endParaRPr lang="en-GB" dirty="0"/>
-          </a:p>
-        </p:txBody>
-      </p:sp>
-      <p:sp>
-        <p:nvSpPr>
-          <p:cNvPr id="4" name="Foliennummernplatzhalter 3">
-            <a:extLst>
-              <a:ext uri="{FF2B5EF4-FFF2-40B4-BE49-F238E27FC236}">
-                <a16:creationId xmlns:a16="http://schemas.microsoft.com/office/drawing/2014/main" id="{5F812391-1D95-81DC-CFDD-A85634B7CF65}"/>
-              </a:ext>
-            </a:extLst>
-          </p:cNvPr>
-          <p:cNvSpPr>
-            <a:spLocks noGrp="1"/>
-          </p:cNvSpPr>
-          <p:nvPr>
-            <p:ph type="sldNum" sz="quarter" idx="12"/>
-          </p:nvPr>
-        </p:nvSpPr>
-        <p:spPr/>
-        <p:txBody>
-          <a:bodyPr/>
-          <a:lstStyle/>
-          <a:p>
-            <a:fld id="{26220596-56CC-4A21-BB03-CA80A4D4AA01}" type="slidenum">
-              <a:rPr lang="en-US" smtClean="0">
-                <a:solidFill>
-                  <a:schemeClr val="bg1"/>
-                </a:solidFill>
-              </a:rPr>
-              <a:t>19</a:t>
             </a:fld>
             <a:endParaRPr lang="en-US" dirty="0">
               <a:solidFill>
@@ -6712,7 +6172,7 @@
           <a:lstStyle/>
           <a:p>
             <a:pPr algn="ctr"/>
-            <a:endParaRPr lang="en-GB"/>
+            <a:endParaRPr lang="en-GB" dirty="0"/>
           </a:p>
         </p:txBody>
       </p:sp>
@@ -6759,7 +6219,7 @@
 </p:sld>
 </file>
 
-<file path=ppt/slides/slide2.xml><?xml version="1.0" encoding="utf-8"?>
+<file path=ppt/slides/slide19.xml><?xml version="1.0" encoding="utf-8"?>
 <p:sld xmlns:a="http://schemas.openxmlformats.org/drawingml/2006/main" xmlns:r="http://schemas.openxmlformats.org/officeDocument/2006/relationships" xmlns:p="http://schemas.openxmlformats.org/presentationml/2006/main">
   <p:cSld>
     <p:spTree>
@@ -6778,10 +6238,10 @@
       </p:grpSpPr>
       <p:sp>
         <p:nvSpPr>
-          <p:cNvPr id="6" name="Rechteck 5">
-            <a:extLst>
-              <a:ext uri="{FF2B5EF4-FFF2-40B4-BE49-F238E27FC236}">
-                <a16:creationId xmlns:a16="http://schemas.microsoft.com/office/drawing/2014/main" id="{4E610316-300D-5544-E20C-51A5485493AE}"/>
+          <p:cNvPr id="5" name="Rechteck 4">
+            <a:extLst>
+              <a:ext uri="{FF2B5EF4-FFF2-40B4-BE49-F238E27FC236}">
+                <a16:creationId xmlns:a16="http://schemas.microsoft.com/office/drawing/2014/main" id="{FE9C6FD6-FE65-42AF-350F-2D87E632C241}"/>
               </a:ext>
             </a:extLst>
           </p:cNvPr>
@@ -6826,7 +6286,7 @@
           <a:lstStyle/>
           <a:p>
             <a:pPr algn="ctr"/>
-            <a:endParaRPr lang="en-GB"/>
+            <a:endParaRPr lang="en-GB" dirty="0"/>
           </a:p>
         </p:txBody>
       </p:sp>
@@ -6835,7 +6295,7 @@
           <p:cNvPr id="2" name="Titel 1">
             <a:extLst>
               <a:ext uri="{FF2B5EF4-FFF2-40B4-BE49-F238E27FC236}">
-                <a16:creationId xmlns:a16="http://schemas.microsoft.com/office/drawing/2014/main" id="{5C91C23D-B1B2-F2A7-7581-BDF4D5D20568}"/>
+                <a16:creationId xmlns:a16="http://schemas.microsoft.com/office/drawing/2014/main" id="{D29F7A83-12B4-9D74-5649-05240742CE19}"/>
               </a:ext>
             </a:extLst>
           </p:cNvPr>
@@ -6852,8 +6312,8 @@
           <a:lstStyle/>
           <a:p>
             <a:r>
-              <a:rPr lang="en-US" u="sng" dirty="0"/>
-              <a:t>Summary</a:t>
+              <a:rPr lang="en-GB" dirty="0"/>
+              <a:t>Template</a:t>
             </a:r>
           </a:p>
         </p:txBody>
@@ -6863,7 +6323,7 @@
           <p:cNvPr id="3" name="Inhaltsplatzhalter 2">
             <a:extLst>
               <a:ext uri="{FF2B5EF4-FFF2-40B4-BE49-F238E27FC236}">
-                <a16:creationId xmlns:a16="http://schemas.microsoft.com/office/drawing/2014/main" id="{58AC9D7B-EF32-B0DE-D2FE-AD568D61A174}"/>
+                <a16:creationId xmlns:a16="http://schemas.microsoft.com/office/drawing/2014/main" id="{56929CB6-1559-0DD1-B9C9-F49DB5A8FD77}"/>
               </a:ext>
             </a:extLst>
           </p:cNvPr>
@@ -6880,46 +6340,27 @@
           <a:lstStyle/>
           <a:p>
             <a:r>
-              <a:rPr lang="en-US" dirty="0"/>
-              <a:t>1) Data structure		-	Lukas</a:t>
-            </a:r>
-          </a:p>
-          <a:p>
-            <a:r>
-              <a:rPr lang="en-US" dirty="0"/>
-              <a:t>2) Learning to make bread	-	 Pablo</a:t>
-            </a:r>
-          </a:p>
-          <a:p>
-            <a:r>
-              <a:rPr lang="en-US" dirty="0"/>
-              <a:t>3) To good to go 		-	</a:t>
-            </a:r>
-            <a:r>
-              <a:rPr lang="en-US" dirty="0" err="1"/>
-              <a:t>Thirith</a:t>
-            </a:r>
-            <a:endParaRPr lang="en-US" dirty="0"/>
-          </a:p>
-          <a:p>
-            <a:r>
-              <a:rPr lang="en-US" dirty="0"/>
-              <a:t>4) Additional Feature – </a:t>
-            </a:r>
-            <a:r>
-              <a:rPr lang="en-US" i="1" dirty="0"/>
-              <a:t>Sleeping Baker</a:t>
-            </a:r>
-            <a:r>
-              <a:rPr lang="en-US" dirty="0"/>
-              <a:t>	-	Marco</a:t>
-            </a:r>
-          </a:p>
-          <a:p>
-            <a:r>
-              <a:rPr lang="en-US" dirty="0"/>
-              <a:t>5) Quick demonstration</a:t>
-            </a:r>
+              <a:rPr lang="en-GB" dirty="0"/>
+              <a:t>Add one</a:t>
+            </a:r>
+          </a:p>
+          <a:p>
+            <a:endParaRPr lang="en-GB" dirty="0"/>
+          </a:p>
+          <a:p>
+            <a:r>
+              <a:rPr lang="en-GB" dirty="0"/>
+              <a:t>Add two</a:t>
+            </a:r>
+          </a:p>
+          <a:p>
+            <a:endParaRPr lang="en-GB" dirty="0"/>
+          </a:p>
+          <a:p>
+            <a:endParaRPr lang="en-GB" dirty="0"/>
+          </a:p>
+          <a:p>
+            <a:endParaRPr lang="en-GB" dirty="0"/>
           </a:p>
         </p:txBody>
       </p:sp>
@@ -6928,7 +6369,7 @@
           <p:cNvPr id="4" name="Foliennummernplatzhalter 3">
             <a:extLst>
               <a:ext uri="{FF2B5EF4-FFF2-40B4-BE49-F238E27FC236}">
-                <a16:creationId xmlns:a16="http://schemas.microsoft.com/office/drawing/2014/main" id="{E497BC7E-28CC-51EF-D687-416EBA653E84}"/>
+                <a16:creationId xmlns:a16="http://schemas.microsoft.com/office/drawing/2014/main" id="{5F812391-1D95-81DC-CFDD-A85634B7CF65}"/>
               </a:ext>
             </a:extLst>
           </p:cNvPr>
@@ -6950,256 +6391,7 @@
                   <a:schemeClr val="bg1"/>
                 </a:solidFill>
               </a:rPr>
-              <a:t>2</a:t>
-            </a:fld>
-            <a:endParaRPr lang="en-US" dirty="0">
-              <a:solidFill>
-                <a:schemeClr val="bg1"/>
-              </a:solidFill>
-            </a:endParaRPr>
-          </a:p>
-        </p:txBody>
-      </p:sp>
-      <p:sp>
-        <p:nvSpPr>
-          <p:cNvPr id="5" name="Rechteck 4">
-            <a:extLst>
-              <a:ext uri="{FF2B5EF4-FFF2-40B4-BE49-F238E27FC236}">
-                <a16:creationId xmlns:a16="http://schemas.microsoft.com/office/drawing/2014/main" id="{56DA0789-BEA4-04B9-6485-BECA14ABDA40}"/>
-              </a:ext>
-            </a:extLst>
-          </p:cNvPr>
-          <p:cNvSpPr/>
-          <p:nvPr/>
-        </p:nvSpPr>
-        <p:spPr>
-          <a:xfrm rot="2700000">
-            <a:off x="182544" y="-563278"/>
-            <a:ext cx="227330" cy="1721870"/>
-          </a:xfrm>
-          <a:prstGeom prst="rect">
-            <a:avLst/>
-          </a:prstGeom>
-          <a:solidFill>
-            <a:srgbClr val="7030A0"/>
-          </a:solidFill>
-          <a:ln>
-            <a:solidFill>
-              <a:schemeClr val="tx1"/>
-            </a:solidFill>
-          </a:ln>
-        </p:spPr>
-        <p:style>
-          <a:lnRef idx="2">
-            <a:schemeClr val="accent1">
-              <a:shade val="50000"/>
-            </a:schemeClr>
-          </a:lnRef>
-          <a:fillRef idx="1">
-            <a:schemeClr val="accent1"/>
-          </a:fillRef>
-          <a:effectRef idx="0">
-            <a:schemeClr val="accent1"/>
-          </a:effectRef>
-          <a:fontRef idx="minor">
-            <a:schemeClr val="lt1"/>
-          </a:fontRef>
-        </p:style>
-        <p:txBody>
-          <a:bodyPr rtlCol="0" anchor="ctr"/>
-          <a:lstStyle/>
-          <a:p>
-            <a:pPr algn="ctr"/>
-            <a:endParaRPr lang="en-GB"/>
-          </a:p>
-        </p:txBody>
-      </p:sp>
-    </p:spTree>
-    <p:extLst>
-      <p:ext uri="{BB962C8B-B14F-4D97-AF65-F5344CB8AC3E}">
-        <p14:creationId xmlns:p14="http://schemas.microsoft.com/office/powerpoint/2010/main" val="2493417131"/>
-      </p:ext>
-    </p:extLst>
-  </p:cSld>
-  <p:clrMapOvr>
-    <a:masterClrMapping/>
-  </p:clrMapOvr>
-</p:sld>
-</file>
-
-<file path=ppt/slides/slide20.xml><?xml version="1.0" encoding="utf-8"?>
-<p:sld xmlns:a="http://schemas.openxmlformats.org/drawingml/2006/main" xmlns:r="http://schemas.openxmlformats.org/officeDocument/2006/relationships" xmlns:p="http://schemas.openxmlformats.org/presentationml/2006/main">
-  <p:cSld>
-    <p:spTree>
-      <p:nvGrpSpPr>
-        <p:cNvPr id="1" name=""/>
-        <p:cNvGrpSpPr/>
-        <p:nvPr/>
-      </p:nvGrpSpPr>
-      <p:grpSpPr>
-        <a:xfrm>
-          <a:off x="0" y="0"/>
-          <a:ext cx="0" cy="0"/>
-          <a:chOff x="0" y="0"/>
-          <a:chExt cx="0" cy="0"/>
-        </a:xfrm>
-      </p:grpSpPr>
-      <p:sp>
-        <p:nvSpPr>
-          <p:cNvPr id="5" name="Rechteck 4">
-            <a:extLst>
-              <a:ext uri="{FF2B5EF4-FFF2-40B4-BE49-F238E27FC236}">
-                <a16:creationId xmlns:a16="http://schemas.microsoft.com/office/drawing/2014/main" id="{FE9C6FD6-FE65-42AF-350F-2D87E632C241}"/>
-              </a:ext>
-            </a:extLst>
-          </p:cNvPr>
-          <p:cNvSpPr/>
-          <p:nvPr/>
-        </p:nvSpPr>
-        <p:spPr>
-          <a:xfrm rot="2700000">
-            <a:off x="11278276" y="4661925"/>
-            <a:ext cx="459165" cy="3209464"/>
-          </a:xfrm>
-          <a:prstGeom prst="rect">
-            <a:avLst/>
-          </a:prstGeom>
-          <a:solidFill>
-            <a:srgbClr val="7030A0"/>
-          </a:solidFill>
-          <a:ln>
-            <a:solidFill>
-              <a:schemeClr val="tx1"/>
-            </a:solidFill>
-          </a:ln>
-        </p:spPr>
-        <p:style>
-          <a:lnRef idx="2">
-            <a:schemeClr val="accent1">
-              <a:shade val="50000"/>
-            </a:schemeClr>
-          </a:lnRef>
-          <a:fillRef idx="1">
-            <a:schemeClr val="accent1"/>
-          </a:fillRef>
-          <a:effectRef idx="0">
-            <a:schemeClr val="accent1"/>
-          </a:effectRef>
-          <a:fontRef idx="minor">
-            <a:schemeClr val="lt1"/>
-          </a:fontRef>
-        </p:style>
-        <p:txBody>
-          <a:bodyPr rtlCol="0" anchor="ctr"/>
-          <a:lstStyle/>
-          <a:p>
-            <a:pPr algn="ctr"/>
-            <a:endParaRPr lang="en-GB"/>
-          </a:p>
-        </p:txBody>
-      </p:sp>
-      <p:sp>
-        <p:nvSpPr>
-          <p:cNvPr id="2" name="Titel 1">
-            <a:extLst>
-              <a:ext uri="{FF2B5EF4-FFF2-40B4-BE49-F238E27FC236}">
-                <a16:creationId xmlns:a16="http://schemas.microsoft.com/office/drawing/2014/main" id="{D29F7A83-12B4-9D74-5649-05240742CE19}"/>
-              </a:ext>
-            </a:extLst>
-          </p:cNvPr>
-          <p:cNvSpPr>
-            <a:spLocks noGrp="1"/>
-          </p:cNvSpPr>
-          <p:nvPr>
-            <p:ph type="title"/>
-          </p:nvPr>
-        </p:nvSpPr>
-        <p:spPr/>
-        <p:txBody>
-          <a:bodyPr/>
-          <a:lstStyle/>
-          <a:p>
-            <a:r>
-              <a:rPr lang="en-GB" dirty="0"/>
-              <a:t>Template</a:t>
-            </a:r>
-          </a:p>
-        </p:txBody>
-      </p:sp>
-      <p:sp>
-        <p:nvSpPr>
-          <p:cNvPr id="3" name="Inhaltsplatzhalter 2">
-            <a:extLst>
-              <a:ext uri="{FF2B5EF4-FFF2-40B4-BE49-F238E27FC236}">
-                <a16:creationId xmlns:a16="http://schemas.microsoft.com/office/drawing/2014/main" id="{56929CB6-1559-0DD1-B9C9-F49DB5A8FD77}"/>
-              </a:ext>
-            </a:extLst>
-          </p:cNvPr>
-          <p:cNvSpPr>
-            <a:spLocks noGrp="1"/>
-          </p:cNvSpPr>
-          <p:nvPr>
-            <p:ph idx="1"/>
-          </p:nvPr>
-        </p:nvSpPr>
-        <p:spPr/>
-        <p:txBody>
-          <a:bodyPr/>
-          <a:lstStyle/>
-          <a:p>
-            <a:r>
-              <a:rPr lang="en-GB" dirty="0"/>
-              <a:t>Add one</a:t>
-            </a:r>
-          </a:p>
-          <a:p>
-            <a:endParaRPr lang="en-GB" dirty="0"/>
-          </a:p>
-          <a:p>
-            <a:r>
-              <a:rPr lang="en-GB" dirty="0"/>
-              <a:t>Add two</a:t>
-            </a:r>
-          </a:p>
-          <a:p>
-            <a:endParaRPr lang="en-GB" dirty="0"/>
-          </a:p>
-          <a:p>
-            <a:endParaRPr lang="en-GB" dirty="0"/>
-          </a:p>
-          <a:p>
-            <a:endParaRPr lang="en-GB" dirty="0"/>
-          </a:p>
-        </p:txBody>
-      </p:sp>
-      <p:sp>
-        <p:nvSpPr>
-          <p:cNvPr id="4" name="Foliennummernplatzhalter 3">
-            <a:extLst>
-              <a:ext uri="{FF2B5EF4-FFF2-40B4-BE49-F238E27FC236}">
-                <a16:creationId xmlns:a16="http://schemas.microsoft.com/office/drawing/2014/main" id="{5F812391-1D95-81DC-CFDD-A85634B7CF65}"/>
-              </a:ext>
-            </a:extLst>
-          </p:cNvPr>
-          <p:cNvSpPr>
-            <a:spLocks noGrp="1"/>
-          </p:cNvSpPr>
-          <p:nvPr>
-            <p:ph type="sldNum" sz="quarter" idx="12"/>
-          </p:nvPr>
-        </p:nvSpPr>
-        <p:spPr/>
-        <p:txBody>
-          <a:bodyPr/>
-          <a:lstStyle/>
-          <a:p>
-            <a:fld id="{26220596-56CC-4A21-BB03-CA80A4D4AA01}" type="slidenum">
-              <a:rPr lang="en-US" smtClean="0">
-                <a:solidFill>
-                  <a:schemeClr val="bg1"/>
-                </a:solidFill>
-              </a:rPr>
-              <a:t>20</a:t>
+              <a:t>19</a:t>
             </a:fld>
             <a:endParaRPr lang="en-US" dirty="0">
               <a:solidFill>
@@ -7252,7 +6444,7 @@
 </p:sld>
 </file>
 
-<file path=ppt/slides/slide21.xml><?xml version="1.0" encoding="utf-8"?>
+<file path=ppt/slides/slide2.xml><?xml version="1.0" encoding="utf-8"?>
 <p:sld xmlns:a="http://schemas.openxmlformats.org/drawingml/2006/main" xmlns:r="http://schemas.openxmlformats.org/officeDocument/2006/relationships" xmlns:p="http://schemas.openxmlformats.org/presentationml/2006/main">
   <p:cSld>
     <p:spTree>
@@ -7271,10 +6463,10 @@
       </p:grpSpPr>
       <p:sp>
         <p:nvSpPr>
-          <p:cNvPr id="5" name="Rechteck 4">
-            <a:extLst>
-              <a:ext uri="{FF2B5EF4-FFF2-40B4-BE49-F238E27FC236}">
-                <a16:creationId xmlns:a16="http://schemas.microsoft.com/office/drawing/2014/main" id="{FE9C6FD6-FE65-42AF-350F-2D87E632C241}"/>
+          <p:cNvPr id="6" name="Rechteck 5">
+            <a:extLst>
+              <a:ext uri="{FF2B5EF4-FFF2-40B4-BE49-F238E27FC236}">
+                <a16:creationId xmlns:a16="http://schemas.microsoft.com/office/drawing/2014/main" id="{4E610316-300D-5544-E20C-51A5485493AE}"/>
               </a:ext>
             </a:extLst>
           </p:cNvPr>
@@ -7319,7 +6511,7 @@
           <a:lstStyle/>
           <a:p>
             <a:pPr algn="ctr"/>
-            <a:endParaRPr lang="en-GB"/>
+            <a:endParaRPr lang="en-GB" dirty="0"/>
           </a:p>
         </p:txBody>
       </p:sp>
@@ -7328,7 +6520,7 @@
           <p:cNvPr id="2" name="Titel 1">
             <a:extLst>
               <a:ext uri="{FF2B5EF4-FFF2-40B4-BE49-F238E27FC236}">
-                <a16:creationId xmlns:a16="http://schemas.microsoft.com/office/drawing/2014/main" id="{D29F7A83-12B4-9D74-5649-05240742CE19}"/>
+                <a16:creationId xmlns:a16="http://schemas.microsoft.com/office/drawing/2014/main" id="{5C91C23D-B1B2-F2A7-7581-BDF4D5D20568}"/>
               </a:ext>
             </a:extLst>
           </p:cNvPr>
@@ -7345,59 +6537,69 @@
           <a:lstStyle/>
           <a:p>
             <a:r>
-              <a:rPr lang="en-GB" dirty="0"/>
+              <a:rPr lang="en-US" u="sng" dirty="0"/>
+              <a:t>Summary</a:t>
+            </a:r>
+          </a:p>
+        </p:txBody>
+      </p:sp>
+      <p:sp>
+        <p:nvSpPr>
+          <p:cNvPr id="3" name="Inhaltsplatzhalter 2">
+            <a:extLst>
+              <a:ext uri="{FF2B5EF4-FFF2-40B4-BE49-F238E27FC236}">
+                <a16:creationId xmlns:a16="http://schemas.microsoft.com/office/drawing/2014/main" id="{58AC9D7B-EF32-B0DE-D2FE-AD568D61A174}"/>
+              </a:ext>
+            </a:extLst>
+          </p:cNvPr>
+          <p:cNvSpPr>
+            <a:spLocks noGrp="1"/>
+          </p:cNvSpPr>
+          <p:nvPr>
+            <p:ph idx="1"/>
+          </p:nvPr>
+        </p:nvSpPr>
+        <p:spPr/>
+        <p:txBody>
+          <a:bodyPr/>
+          <a:lstStyle/>
+          <a:p>
+            <a:r>
+              <a:rPr lang="en-US" dirty="0"/>
+              <a:t>1) Data structure		-	Lukas</a:t>
+            </a:r>
+          </a:p>
+          <a:p>
+            <a:r>
+              <a:rPr lang="en-US" dirty="0"/>
+              <a:t>2) Learning to make bread	-	 Pablo</a:t>
+            </a:r>
+          </a:p>
+          <a:p>
+            <a:r>
+              <a:rPr lang="en-US" dirty="0"/>
+              <a:t>3) To good to go 		-	Thirith</a:t>
+            </a:r>
+          </a:p>
+          <a:p>
+            <a:r>
+              <a:rPr lang="en-US" dirty="0"/>
               <a:t>4) Additional Feature – </a:t>
             </a:r>
             <a:r>
-              <a:rPr lang="en-GB" i="1" dirty="0"/>
+              <a:rPr lang="en-US" i="1" dirty="0"/>
               <a:t>Sleeping Baker</a:t>
             </a:r>
-          </a:p>
-        </p:txBody>
-      </p:sp>
-      <p:sp>
-        <p:nvSpPr>
-          <p:cNvPr id="3" name="Inhaltsplatzhalter 2">
-            <a:extLst>
-              <a:ext uri="{FF2B5EF4-FFF2-40B4-BE49-F238E27FC236}">
-                <a16:creationId xmlns:a16="http://schemas.microsoft.com/office/drawing/2014/main" id="{56929CB6-1559-0DD1-B9C9-F49DB5A8FD77}"/>
-              </a:ext>
-            </a:extLst>
-          </p:cNvPr>
-          <p:cNvSpPr>
-            <a:spLocks noGrp="1"/>
-          </p:cNvSpPr>
-          <p:nvPr>
-            <p:ph idx="1"/>
-          </p:nvPr>
-        </p:nvSpPr>
-        <p:spPr/>
-        <p:txBody>
-          <a:bodyPr/>
-          <a:lstStyle/>
-          <a:p>
-            <a:r>
-              <a:rPr lang="en-GB" dirty="0"/>
-              <a:t>Add one</a:t>
-            </a:r>
-          </a:p>
-          <a:p>
-            <a:endParaRPr lang="en-GB" dirty="0"/>
-          </a:p>
-          <a:p>
-            <a:r>
-              <a:rPr lang="en-GB" dirty="0"/>
-              <a:t>Add two</a:t>
-            </a:r>
-          </a:p>
-          <a:p>
-            <a:endParaRPr lang="en-GB" dirty="0"/>
-          </a:p>
-          <a:p>
-            <a:endParaRPr lang="en-GB" dirty="0"/>
-          </a:p>
-          <a:p>
-            <a:endParaRPr lang="en-GB" dirty="0"/>
+            <a:r>
+              <a:rPr lang="en-US" dirty="0"/>
+              <a:t>	-	Marco</a:t>
+            </a:r>
+          </a:p>
+          <a:p>
+            <a:r>
+              <a:rPr lang="en-US" dirty="0"/>
+              <a:t>5) Quick demonstration</a:t>
+            </a:r>
           </a:p>
         </p:txBody>
       </p:sp>
@@ -7406,7 +6608,7 @@
           <p:cNvPr id="4" name="Foliennummernplatzhalter 3">
             <a:extLst>
               <a:ext uri="{FF2B5EF4-FFF2-40B4-BE49-F238E27FC236}">
-                <a16:creationId xmlns:a16="http://schemas.microsoft.com/office/drawing/2014/main" id="{5F812391-1D95-81DC-CFDD-A85634B7CF65}"/>
+                <a16:creationId xmlns:a16="http://schemas.microsoft.com/office/drawing/2014/main" id="{E497BC7E-28CC-51EF-D687-416EBA653E84}"/>
               </a:ext>
             </a:extLst>
           </p:cNvPr>
@@ -7428,7 +6630,7 @@
                   <a:schemeClr val="bg1"/>
                 </a:solidFill>
               </a:rPr>
-              <a:t>21</a:t>
+              <a:t>2</a:t>
             </a:fld>
             <a:endParaRPr lang="en-US" dirty="0">
               <a:solidFill>
@@ -7440,10 +6642,10 @@
       </p:sp>
       <p:sp>
         <p:nvSpPr>
-          <p:cNvPr id="6" name="Rechteck 5">
-            <a:extLst>
-              <a:ext uri="{FF2B5EF4-FFF2-40B4-BE49-F238E27FC236}">
-                <a16:creationId xmlns:a16="http://schemas.microsoft.com/office/drawing/2014/main" id="{704AB728-31D4-BBCE-EB2D-AF4E22A47A60}"/>
+          <p:cNvPr id="5" name="Rechteck 4">
+            <a:extLst>
+              <a:ext uri="{FF2B5EF4-FFF2-40B4-BE49-F238E27FC236}">
+                <a16:creationId xmlns:a16="http://schemas.microsoft.com/office/drawing/2014/main" id="{56DA0789-BEA4-04B9-6485-BECA14ABDA40}"/>
               </a:ext>
             </a:extLst>
           </p:cNvPr>
@@ -7488,7 +6690,260 @@
           <a:lstStyle/>
           <a:p>
             <a:pPr algn="ctr"/>
-            <a:endParaRPr lang="en-GB"/>
+            <a:endParaRPr lang="en-GB" dirty="0"/>
+          </a:p>
+        </p:txBody>
+      </p:sp>
+    </p:spTree>
+    <p:extLst>
+      <p:ext uri="{BB962C8B-B14F-4D97-AF65-F5344CB8AC3E}">
+        <p14:creationId xmlns:p14="http://schemas.microsoft.com/office/powerpoint/2010/main" val="2493417131"/>
+      </p:ext>
+    </p:extLst>
+  </p:cSld>
+  <p:clrMapOvr>
+    <a:masterClrMapping/>
+  </p:clrMapOvr>
+</p:sld>
+</file>
+
+<file path=ppt/slides/slide20.xml><?xml version="1.0" encoding="utf-8"?>
+<p:sld xmlns:a="http://schemas.openxmlformats.org/drawingml/2006/main" xmlns:r="http://schemas.openxmlformats.org/officeDocument/2006/relationships" xmlns:p="http://schemas.openxmlformats.org/presentationml/2006/main">
+  <p:cSld>
+    <p:spTree>
+      <p:nvGrpSpPr>
+        <p:cNvPr id="1" name=""/>
+        <p:cNvGrpSpPr/>
+        <p:nvPr/>
+      </p:nvGrpSpPr>
+      <p:grpSpPr>
+        <a:xfrm>
+          <a:off x="0" y="0"/>
+          <a:ext cx="0" cy="0"/>
+          <a:chOff x="0" y="0"/>
+          <a:chExt cx="0" cy="0"/>
+        </a:xfrm>
+      </p:grpSpPr>
+      <p:sp>
+        <p:nvSpPr>
+          <p:cNvPr id="5" name="Rechteck 4">
+            <a:extLst>
+              <a:ext uri="{FF2B5EF4-FFF2-40B4-BE49-F238E27FC236}">
+                <a16:creationId xmlns:a16="http://schemas.microsoft.com/office/drawing/2014/main" id="{FE9C6FD6-FE65-42AF-350F-2D87E632C241}"/>
+              </a:ext>
+            </a:extLst>
+          </p:cNvPr>
+          <p:cNvSpPr/>
+          <p:nvPr/>
+        </p:nvSpPr>
+        <p:spPr>
+          <a:xfrm rot="2700000">
+            <a:off x="11278276" y="4661925"/>
+            <a:ext cx="459165" cy="3209464"/>
+          </a:xfrm>
+          <a:prstGeom prst="rect">
+            <a:avLst/>
+          </a:prstGeom>
+          <a:solidFill>
+            <a:srgbClr val="7030A0"/>
+          </a:solidFill>
+          <a:ln>
+            <a:solidFill>
+              <a:schemeClr val="tx1"/>
+            </a:solidFill>
+          </a:ln>
+        </p:spPr>
+        <p:style>
+          <a:lnRef idx="2">
+            <a:schemeClr val="accent1">
+              <a:shade val="50000"/>
+            </a:schemeClr>
+          </a:lnRef>
+          <a:fillRef idx="1">
+            <a:schemeClr val="accent1"/>
+          </a:fillRef>
+          <a:effectRef idx="0">
+            <a:schemeClr val="accent1"/>
+          </a:effectRef>
+          <a:fontRef idx="minor">
+            <a:schemeClr val="lt1"/>
+          </a:fontRef>
+        </p:style>
+        <p:txBody>
+          <a:bodyPr rtlCol="0" anchor="ctr"/>
+          <a:lstStyle/>
+          <a:p>
+            <a:pPr algn="ctr"/>
+            <a:endParaRPr lang="en-GB" dirty="0"/>
+          </a:p>
+        </p:txBody>
+      </p:sp>
+      <p:sp>
+        <p:nvSpPr>
+          <p:cNvPr id="2" name="Titel 1">
+            <a:extLst>
+              <a:ext uri="{FF2B5EF4-FFF2-40B4-BE49-F238E27FC236}">
+                <a16:creationId xmlns:a16="http://schemas.microsoft.com/office/drawing/2014/main" id="{D29F7A83-12B4-9D74-5649-05240742CE19}"/>
+              </a:ext>
+            </a:extLst>
+          </p:cNvPr>
+          <p:cNvSpPr>
+            <a:spLocks noGrp="1"/>
+          </p:cNvSpPr>
+          <p:nvPr>
+            <p:ph type="title"/>
+          </p:nvPr>
+        </p:nvSpPr>
+        <p:spPr/>
+        <p:txBody>
+          <a:bodyPr/>
+          <a:lstStyle/>
+          <a:p>
+            <a:r>
+              <a:rPr lang="en-GB" dirty="0"/>
+              <a:t>4) Additional Feature – </a:t>
+            </a:r>
+            <a:r>
+              <a:rPr lang="en-GB" i="1" dirty="0"/>
+              <a:t>Sleeping Baker</a:t>
+            </a:r>
+          </a:p>
+        </p:txBody>
+      </p:sp>
+      <p:sp>
+        <p:nvSpPr>
+          <p:cNvPr id="3" name="Inhaltsplatzhalter 2">
+            <a:extLst>
+              <a:ext uri="{FF2B5EF4-FFF2-40B4-BE49-F238E27FC236}">
+                <a16:creationId xmlns:a16="http://schemas.microsoft.com/office/drawing/2014/main" id="{56929CB6-1559-0DD1-B9C9-F49DB5A8FD77}"/>
+              </a:ext>
+            </a:extLst>
+          </p:cNvPr>
+          <p:cNvSpPr>
+            <a:spLocks noGrp="1"/>
+          </p:cNvSpPr>
+          <p:nvPr>
+            <p:ph idx="1"/>
+          </p:nvPr>
+        </p:nvSpPr>
+        <p:spPr/>
+        <p:txBody>
+          <a:bodyPr/>
+          <a:lstStyle/>
+          <a:p>
+            <a:r>
+              <a:rPr lang="en-GB" dirty="0"/>
+              <a:t>Add one</a:t>
+            </a:r>
+          </a:p>
+          <a:p>
+            <a:endParaRPr lang="en-GB" dirty="0"/>
+          </a:p>
+          <a:p>
+            <a:r>
+              <a:rPr lang="en-GB" dirty="0"/>
+              <a:t>Add two</a:t>
+            </a:r>
+          </a:p>
+          <a:p>
+            <a:endParaRPr lang="en-GB" dirty="0"/>
+          </a:p>
+          <a:p>
+            <a:endParaRPr lang="en-GB" dirty="0"/>
+          </a:p>
+          <a:p>
+            <a:endParaRPr lang="en-GB" dirty="0"/>
+          </a:p>
+        </p:txBody>
+      </p:sp>
+      <p:sp>
+        <p:nvSpPr>
+          <p:cNvPr id="4" name="Foliennummernplatzhalter 3">
+            <a:extLst>
+              <a:ext uri="{FF2B5EF4-FFF2-40B4-BE49-F238E27FC236}">
+                <a16:creationId xmlns:a16="http://schemas.microsoft.com/office/drawing/2014/main" id="{5F812391-1D95-81DC-CFDD-A85634B7CF65}"/>
+              </a:ext>
+            </a:extLst>
+          </p:cNvPr>
+          <p:cNvSpPr>
+            <a:spLocks noGrp="1"/>
+          </p:cNvSpPr>
+          <p:nvPr>
+            <p:ph type="sldNum" sz="quarter" idx="12"/>
+          </p:nvPr>
+        </p:nvSpPr>
+        <p:spPr/>
+        <p:txBody>
+          <a:bodyPr/>
+          <a:lstStyle/>
+          <a:p>
+            <a:fld id="{26220596-56CC-4A21-BB03-CA80A4D4AA01}" type="slidenum">
+              <a:rPr lang="en-US" smtClean="0">
+                <a:solidFill>
+                  <a:schemeClr val="bg1"/>
+                </a:solidFill>
+              </a:rPr>
+              <a:t>20</a:t>
+            </a:fld>
+            <a:endParaRPr lang="en-US" dirty="0">
+              <a:solidFill>
+                <a:schemeClr val="bg1"/>
+              </a:solidFill>
+            </a:endParaRPr>
+          </a:p>
+        </p:txBody>
+      </p:sp>
+      <p:sp>
+        <p:nvSpPr>
+          <p:cNvPr id="6" name="Rechteck 5">
+            <a:extLst>
+              <a:ext uri="{FF2B5EF4-FFF2-40B4-BE49-F238E27FC236}">
+                <a16:creationId xmlns:a16="http://schemas.microsoft.com/office/drawing/2014/main" id="{704AB728-31D4-BBCE-EB2D-AF4E22A47A60}"/>
+              </a:ext>
+            </a:extLst>
+          </p:cNvPr>
+          <p:cNvSpPr/>
+          <p:nvPr/>
+        </p:nvSpPr>
+        <p:spPr>
+          <a:xfrm rot="2700000">
+            <a:off x="182544" y="-563278"/>
+            <a:ext cx="227330" cy="1721870"/>
+          </a:xfrm>
+          <a:prstGeom prst="rect">
+            <a:avLst/>
+          </a:prstGeom>
+          <a:solidFill>
+            <a:srgbClr val="7030A0"/>
+          </a:solidFill>
+          <a:ln>
+            <a:solidFill>
+              <a:schemeClr val="tx1"/>
+            </a:solidFill>
+          </a:ln>
+        </p:spPr>
+        <p:style>
+          <a:lnRef idx="2">
+            <a:schemeClr val="accent1">
+              <a:shade val="50000"/>
+            </a:schemeClr>
+          </a:lnRef>
+          <a:fillRef idx="1">
+            <a:schemeClr val="accent1"/>
+          </a:fillRef>
+          <a:effectRef idx="0">
+            <a:schemeClr val="accent1"/>
+          </a:effectRef>
+          <a:fontRef idx="minor">
+            <a:schemeClr val="lt1"/>
+          </a:fontRef>
+        </p:style>
+        <p:txBody>
+          <a:bodyPr rtlCol="0" anchor="ctr"/>
+          <a:lstStyle/>
+          <a:p>
+            <a:pPr algn="ctr"/>
+            <a:endParaRPr lang="en-GB" dirty="0"/>
           </a:p>
         </p:txBody>
       </p:sp>
@@ -7565,7 +7020,7 @@
 </p:sld>
 </file>
 
-<file path=ppt/slides/slide22.xml><?xml version="1.0" encoding="utf-8"?>
+<file path=ppt/slides/slide21.xml><?xml version="1.0" encoding="utf-8"?>
 <p:sld xmlns:a="http://schemas.openxmlformats.org/drawingml/2006/main" xmlns:r="http://schemas.openxmlformats.org/officeDocument/2006/relationships" xmlns:p="http://schemas.openxmlformats.org/presentationml/2006/main">
   <p:cSld>
     <p:spTree>
@@ -7662,7 +7117,7 @@
           <a:lstStyle/>
           <a:p>
             <a:pPr algn="ctr"/>
-            <a:endParaRPr lang="en-GB"/>
+            <a:endParaRPr lang="en-GB" dirty="0"/>
           </a:p>
         </p:txBody>
       </p:sp>
@@ -7761,7 +7216,7 @@
                   <a:schemeClr val="bg1"/>
                 </a:solidFill>
               </a:rPr>
-              <a:t>22</a:t>
+              <a:t>21</a:t>
             </a:fld>
             <a:endParaRPr lang="en-US" dirty="0">
               <a:solidFill>
@@ -7814,7 +7269,7 @@
 </p:sld>
 </file>
 
-<file path=ppt/slides/slide23.xml><?xml version="1.0" encoding="utf-8"?>
+<file path=ppt/slides/slide22.xml><?xml version="1.0" encoding="utf-8"?>
 <p:sld xmlns:a="http://schemas.openxmlformats.org/drawingml/2006/main" xmlns:r="http://schemas.openxmlformats.org/officeDocument/2006/relationships" xmlns:p="http://schemas.openxmlformats.org/presentationml/2006/main">
   <p:cSld>
     <p:spTree>
@@ -7881,7 +7336,7 @@
           <a:lstStyle/>
           <a:p>
             <a:pPr algn="ctr"/>
-            <a:endParaRPr lang="en-GB"/>
+            <a:endParaRPr lang="en-GB" dirty="0"/>
           </a:p>
         </p:txBody>
       </p:sp>
@@ -7986,7 +7441,7 @@
                   <a:schemeClr val="bg1"/>
                 </a:solidFill>
               </a:rPr>
-              <a:t>23</a:t>
+              <a:t>22</a:t>
             </a:fld>
             <a:endParaRPr lang="en-US" dirty="0">
               <a:solidFill>
@@ -8046,7 +7501,7 @@
           <a:lstStyle/>
           <a:p>
             <a:pPr algn="ctr"/>
-            <a:endParaRPr lang="en-GB"/>
+            <a:endParaRPr lang="en-GB" dirty="0"/>
           </a:p>
         </p:txBody>
       </p:sp>
@@ -8063,7 +7518,7 @@
 </p:sld>
 </file>
 
-<file path=ppt/slides/slide24.xml><?xml version="1.0" encoding="utf-8"?>
+<file path=ppt/slides/slide23.xml><?xml version="1.0" encoding="utf-8"?>
 <p:sld xmlns:a="http://schemas.openxmlformats.org/drawingml/2006/main" xmlns:r="http://schemas.openxmlformats.org/officeDocument/2006/relationships" xmlns:p="http://schemas.openxmlformats.org/presentationml/2006/main">
   <p:cSld>
     <p:spTree>
@@ -8130,7 +7585,7 @@
           <a:lstStyle/>
           <a:p>
             <a:pPr algn="ctr"/>
-            <a:endParaRPr lang="en-GB"/>
+            <a:endParaRPr lang="en-GB" dirty="0"/>
           </a:p>
         </p:txBody>
       </p:sp>
@@ -8235,7 +7690,7 @@
                   <a:schemeClr val="bg1"/>
                 </a:solidFill>
               </a:rPr>
-              <a:t>24</a:t>
+              <a:t>23</a:t>
             </a:fld>
             <a:endParaRPr lang="en-US" dirty="0">
               <a:solidFill>
@@ -8258,7 +7713,7 @@
 </p:sld>
 </file>
 
-<file path=ppt/slides/slide25.xml><?xml version="1.0" encoding="utf-8"?>
+<file path=ppt/slides/slide24.xml><?xml version="1.0" encoding="utf-8"?>
 <p:sld xmlns:a="http://schemas.openxmlformats.org/drawingml/2006/main" xmlns:r="http://schemas.openxmlformats.org/officeDocument/2006/relationships" xmlns:p="http://schemas.openxmlformats.org/presentationml/2006/main">
   <p:cSld>
     <p:spTree>
@@ -8325,7 +7780,7 @@
           <a:lstStyle/>
           <a:p>
             <a:pPr algn="ctr"/>
-            <a:endParaRPr lang="en-GB"/>
+            <a:endParaRPr lang="en-GB" dirty="0"/>
           </a:p>
         </p:txBody>
       </p:sp>
@@ -8430,7 +7885,7 @@
                   <a:schemeClr val="bg1"/>
                 </a:solidFill>
               </a:rPr>
-              <a:t>25</a:t>
+              <a:t>24</a:t>
             </a:fld>
             <a:endParaRPr lang="en-US" dirty="0">
               <a:solidFill>
@@ -8453,7 +7908,7 @@
 </p:sld>
 </file>
 
-<file path=ppt/slides/slide26.xml><?xml version="1.0" encoding="utf-8"?>
+<file path=ppt/slides/slide25.xml><?xml version="1.0" encoding="utf-8"?>
 <p:sld xmlns:a="http://schemas.openxmlformats.org/drawingml/2006/main" xmlns:r="http://schemas.openxmlformats.org/officeDocument/2006/relationships" xmlns:p="http://schemas.openxmlformats.org/presentationml/2006/main">
   <p:cSld>
     <p:spTree>
@@ -8581,7 +8036,7 @@
           <a:lstStyle/>
           <a:p>
             <a:pPr algn="ctr"/>
-            <a:endParaRPr lang="en-GB"/>
+            <a:endParaRPr lang="en-GB" dirty="0"/>
           </a:p>
         </p:txBody>
       </p:sp>
@@ -8635,7 +8090,7 @@
           <a:lstStyle/>
           <a:p>
             <a:pPr algn="ctr"/>
-            <a:endParaRPr lang="en-GB"/>
+            <a:endParaRPr lang="en-GB" dirty="0"/>
           </a:p>
         </p:txBody>
       </p:sp>
@@ -8652,7 +8107,7 @@
 </p:sld>
 </file>
 
-<file path=ppt/slides/slide27.xml><?xml version="1.0" encoding="utf-8"?>
+<file path=ppt/slides/slide26.xml><?xml version="1.0" encoding="utf-8"?>
 <p:sld xmlns:a="http://schemas.openxmlformats.org/drawingml/2006/main" xmlns:r="http://schemas.openxmlformats.org/officeDocument/2006/relationships" xmlns:p="http://schemas.openxmlformats.org/presentationml/2006/main">
   <p:cSld>
     <p:spTree>
@@ -8719,7 +8174,7 @@
           <a:lstStyle/>
           <a:p>
             <a:pPr algn="ctr"/>
-            <a:endParaRPr lang="en-GB"/>
+            <a:endParaRPr lang="en-GB" dirty="0"/>
           </a:p>
         </p:txBody>
       </p:sp>
@@ -8822,7 +8277,7 @@
                   <a:schemeClr val="bg1"/>
                 </a:solidFill>
               </a:rPr>
-              <a:t>27</a:t>
+              <a:t>26</a:t>
             </a:fld>
             <a:endParaRPr lang="en-US" dirty="0">
               <a:solidFill>
@@ -8912,7 +8367,7 @@
           <a:lstStyle/>
           <a:p>
             <a:pPr algn="ctr"/>
-            <a:endParaRPr lang="en-GB"/>
+            <a:endParaRPr lang="en-GB" dirty="0"/>
           </a:p>
         </p:txBody>
       </p:sp>
@@ -9168,7 +8623,7 @@
           <a:lstStyle/>
           <a:p>
             <a:pPr algn="ctr"/>
-            <a:endParaRPr lang="en-GB"/>
+            <a:endParaRPr lang="en-GB" dirty="0"/>
           </a:p>
         </p:txBody>
       </p:sp>
@@ -9318,7 +8773,7 @@
           <a:lstStyle/>
           <a:p>
             <a:pPr algn="ctr"/>
-            <a:endParaRPr lang="en-GB"/>
+            <a:endParaRPr lang="en-GB" dirty="0"/>
           </a:p>
         </p:txBody>
       </p:sp>

</xml_diff>